<commit_message>
add qr-code for Souza C. 2024
</commit_message>
<xml_diff>
--- a/CLAISSA/ECOLOGIA VIRAL DE AVES MIGRATÓRIAS DE LONGA DISTANCIA NA AMAZONIA COSTEIRA DURANTE O PERIODO DE INVERNADA.pptx
+++ b/CLAISSA/ECOLOGIA VIRAL DE AVES MIGRATÓRIAS DE LONGA DISTANCIA NA AMAZONIA COSTEIRA DURANTE O PERIODO DE INVERNADA.pptx
@@ -485,7 +485,7 @@
               <a:pPr>
                 <a:defRPr/>
               </a:pPr>
-              <a:t>11/10/2024</a:t>
+              <a:t>16/10/2024</a:t>
             </a:fld>
             <a:endParaRPr lang="pt-BR"/>
           </a:p>
@@ -7033,42 +7033,6 @@
           </a:p>
         </p:txBody>
       </p:sp>
-      <p:pic>
-        <p:nvPicPr>
-          <p:cNvPr id="11" name="Imagem 10">
-            <a:extLst>
-              <a:ext uri="{FF2B5EF4-FFF2-40B4-BE49-F238E27FC236}">
-                <a16:creationId xmlns:a16="http://schemas.microsoft.com/office/drawing/2014/main" id="{95CABF96-AD98-B1D8-8D36-E2097A58CF7B}"/>
-              </a:ext>
-            </a:extLst>
-          </p:cNvPr>
-          <p:cNvPicPr>
-            <a:picLocks noChangeAspect="1"/>
-          </p:cNvPicPr>
-          <p:nvPr/>
-        </p:nvPicPr>
-        <p:blipFill>
-          <a:blip r:embed="rId9" cstate="print">
-            <a:extLst>
-              <a:ext uri="{28A0092B-C50C-407E-A947-70E740481C1C}">
-                <a14:useLocalDpi xmlns:a14="http://schemas.microsoft.com/office/drawing/2010/main" val="0"/>
-              </a:ext>
-            </a:extLst>
-          </a:blip>
-          <a:stretch>
-            <a:fillRect/>
-          </a:stretch>
-        </p:blipFill>
-        <p:spPr>
-          <a:xfrm>
-            <a:off x="24433350" y="32415597"/>
-            <a:ext cx="4038430" cy="4038430"/>
-          </a:xfrm>
-          <a:prstGeom prst="rect">
-            <a:avLst/>
-          </a:prstGeom>
-        </p:spPr>
-      </p:pic>
       <p:sp>
         <p:nvSpPr>
           <p:cNvPr id="12" name="AutoShape 2">
@@ -7120,6 +7084,1320 @@
             <a:extLst>
               <a:ext uri="{FF2B5EF4-FFF2-40B4-BE49-F238E27FC236}">
                 <a16:creationId xmlns:a16="http://schemas.microsoft.com/office/drawing/2014/main" id="{73AC2C76-F08D-FA0B-2212-AC2FC9D20B24}"/>
+              </a:ext>
+            </a:extLst>
+          </p:cNvPr>
+          <p:cNvPicPr>
+            <a:picLocks noChangeAspect="1"/>
+          </p:cNvPicPr>
+          <p:nvPr/>
+        </p:nvPicPr>
+        <p:blipFill>
+          <a:blip r:embed="rId9"/>
+          <a:stretch>
+            <a:fillRect/>
+          </a:stretch>
+        </p:blipFill>
+        <p:spPr>
+          <a:xfrm>
+            <a:off x="748865" y="28312954"/>
+            <a:ext cx="10205776" cy="4076910"/>
+          </a:xfrm>
+          <a:prstGeom prst="rect">
+            <a:avLst/>
+          </a:prstGeom>
+        </p:spPr>
+      </p:pic>
+      <p:sp>
+        <p:nvSpPr>
+          <p:cNvPr id="15" name="CaixaDeTexto 14">
+            <a:extLst>
+              <a:ext uri="{FF2B5EF4-FFF2-40B4-BE49-F238E27FC236}">
+                <a16:creationId xmlns:a16="http://schemas.microsoft.com/office/drawing/2014/main" id="{D3F2F037-4496-CD16-5AE0-648588DC7DF7}"/>
+              </a:ext>
+            </a:extLst>
+          </p:cNvPr>
+          <p:cNvSpPr txBox="1"/>
+          <p:nvPr/>
+        </p:nvSpPr>
+        <p:spPr>
+          <a:xfrm>
+            <a:off x="724546" y="32681709"/>
+            <a:ext cx="10100038" cy="1619098"/>
+          </a:xfrm>
+          <a:prstGeom prst="rect">
+            <a:avLst/>
+          </a:prstGeom>
+          <a:noFill/>
+        </p:spPr>
+        <p:txBody>
+          <a:bodyPr wrap="square" rtlCol="0">
+            <a:spAutoFit/>
+          </a:bodyPr>
+          <a:lstStyle/>
+          <a:p>
+            <a:pPr algn="l"/>
+            <a:r>
+              <a:rPr lang="pt-BR" sz="3307" b="1" dirty="0">
+                <a:latin typeface="Arial" panose="020B0604020202020204" pitchFamily="34" charset="0"/>
+                <a:cs typeface="Arial" panose="020B0604020202020204" pitchFamily="34" charset="0"/>
+              </a:rPr>
+              <a:t>Figura 1</a:t>
+            </a:r>
+            <a:r>
+              <a:rPr lang="en-US" sz="3307" b="1" dirty="0">
+                <a:latin typeface="Arial" panose="020B0604020202020204" pitchFamily="34" charset="0"/>
+                <a:cs typeface="Arial" panose="020B0604020202020204" pitchFamily="34" charset="0"/>
+              </a:rPr>
+              <a:t>- </a:t>
+            </a:r>
+            <a:r>
+              <a:rPr lang="pt-BR" sz="3307" i="1" dirty="0" err="1">
+                <a:latin typeface="Arial" panose="020B0604020202020204" pitchFamily="34" charset="0"/>
+                <a:cs typeface="Arial" panose="020B0604020202020204" pitchFamily="34" charset="0"/>
+              </a:rPr>
+              <a:t>Actitis</a:t>
+            </a:r>
+            <a:r>
+              <a:rPr lang="pt-BR" sz="3307" i="1" dirty="0">
+                <a:latin typeface="Arial" panose="020B0604020202020204" pitchFamily="34" charset="0"/>
+                <a:cs typeface="Arial" panose="020B0604020202020204" pitchFamily="34" charset="0"/>
+              </a:rPr>
+              <a:t> </a:t>
+            </a:r>
+            <a:r>
+              <a:rPr lang="pt-BR" sz="3307" i="1" dirty="0" err="1">
+                <a:latin typeface="Arial" panose="020B0604020202020204" pitchFamily="34" charset="0"/>
+                <a:cs typeface="Arial" panose="020B0604020202020204" pitchFamily="34" charset="0"/>
+              </a:rPr>
+              <a:t>macularius</a:t>
+            </a:r>
+            <a:r>
+              <a:rPr lang="pt-BR" sz="3307" dirty="0">
+                <a:latin typeface="Arial" panose="020B0604020202020204" pitchFamily="34" charset="0"/>
+                <a:cs typeface="Arial" panose="020B0604020202020204" pitchFamily="34" charset="0"/>
+              </a:rPr>
+              <a:t>. </a:t>
+            </a:r>
+            <a:r>
+              <a:rPr lang="pt-BR" sz="3307" b="1" dirty="0">
+                <a:latin typeface="Arial" panose="020B0604020202020204" pitchFamily="34" charset="0"/>
+                <a:cs typeface="Arial" panose="020B0604020202020204" pitchFamily="34" charset="0"/>
+              </a:rPr>
+              <a:t>Em A plumagem não reprodutiva, em B plumagem reprodutiva, Da Cunha </a:t>
+            </a:r>
+            <a:r>
+              <a:rPr lang="pt-BR" sz="3307" b="1" i="1" dirty="0">
+                <a:latin typeface="Arial" panose="020B0604020202020204" pitchFamily="34" charset="0"/>
+                <a:cs typeface="Arial" panose="020B0604020202020204" pitchFamily="34" charset="0"/>
+              </a:rPr>
+              <a:t>et al.</a:t>
+            </a:r>
+          </a:p>
+        </p:txBody>
+      </p:sp>
+      <p:sp>
+        <p:nvSpPr>
+          <p:cNvPr id="16" name="CaixaDeTexto 15">
+            <a:extLst>
+              <a:ext uri="{FF2B5EF4-FFF2-40B4-BE49-F238E27FC236}">
+                <a16:creationId xmlns:a16="http://schemas.microsoft.com/office/drawing/2014/main" id="{B5AAEB80-E0C1-EF4D-4565-25953825823D}"/>
+              </a:ext>
+            </a:extLst>
+          </p:cNvPr>
+          <p:cNvSpPr txBox="1"/>
+          <p:nvPr/>
+        </p:nvSpPr>
+        <p:spPr>
+          <a:xfrm>
+            <a:off x="21479655" y="11882675"/>
+            <a:ext cx="10392148" cy="1110176"/>
+          </a:xfrm>
+          <a:prstGeom prst="rect">
+            <a:avLst/>
+          </a:prstGeom>
+          <a:noFill/>
+        </p:spPr>
+        <p:txBody>
+          <a:bodyPr wrap="square" rtlCol="0">
+            <a:spAutoFit/>
+          </a:bodyPr>
+          <a:lstStyle/>
+          <a:p>
+            <a:pPr algn="l"/>
+            <a:r>
+              <a:rPr lang="pt-BR" sz="3307" b="1" dirty="0" err="1">
+                <a:latin typeface="Arial" panose="020B0604020202020204" pitchFamily="34" charset="0"/>
+                <a:cs typeface="Arial" panose="020B0604020202020204" pitchFamily="34" charset="0"/>
+              </a:rPr>
+              <a:t>Tablela</a:t>
+            </a:r>
+            <a:r>
+              <a:rPr lang="pt-BR" sz="3307" b="1" dirty="0">
+                <a:latin typeface="Arial" panose="020B0604020202020204" pitchFamily="34" charset="0"/>
+                <a:cs typeface="Arial" panose="020B0604020202020204" pitchFamily="34" charset="0"/>
+              </a:rPr>
+              <a:t> 1- Vírus humanos encontrados no genoma de </a:t>
+            </a:r>
+            <a:r>
+              <a:rPr lang="pt-BR" sz="3307" i="1" dirty="0" err="1">
+                <a:latin typeface="Arial" panose="020B0604020202020204" pitchFamily="34" charset="0"/>
+                <a:cs typeface="Arial" panose="020B0604020202020204" pitchFamily="34" charset="0"/>
+              </a:rPr>
+              <a:t>Actitis</a:t>
+            </a:r>
+            <a:r>
+              <a:rPr lang="pt-BR" sz="3307" i="1" dirty="0">
+                <a:latin typeface="Arial" panose="020B0604020202020204" pitchFamily="34" charset="0"/>
+                <a:cs typeface="Arial" panose="020B0604020202020204" pitchFamily="34" charset="0"/>
+              </a:rPr>
+              <a:t>,</a:t>
+            </a:r>
+            <a:r>
+              <a:rPr lang="pt-BR" sz="3307" b="1" dirty="0">
+                <a:latin typeface="Arial" panose="020B0604020202020204" pitchFamily="34" charset="0"/>
+                <a:cs typeface="Arial" panose="020B0604020202020204" pitchFamily="34" charset="0"/>
+              </a:rPr>
+              <a:t> IFPA 2023.</a:t>
+            </a:r>
+          </a:p>
+        </p:txBody>
+      </p:sp>
+      <p:sp>
+        <p:nvSpPr>
+          <p:cNvPr id="17" name="Text Box 21">
+            <a:extLst>
+              <a:ext uri="{FF2B5EF4-FFF2-40B4-BE49-F238E27FC236}">
+                <a16:creationId xmlns:a16="http://schemas.microsoft.com/office/drawing/2014/main" id="{D261B900-0C2B-2518-9B15-108AF7256BC1}"/>
+              </a:ext>
+            </a:extLst>
+          </p:cNvPr>
+          <p:cNvSpPr txBox="1"/>
+          <p:nvPr/>
+        </p:nvSpPr>
+        <p:spPr bwMode="auto">
+          <a:xfrm>
+            <a:off x="13343943" y="14613050"/>
+            <a:ext cx="5999395" cy="1605082"/>
+          </a:xfrm>
+          <a:prstGeom prst="rect">
+            <a:avLst/>
+          </a:prstGeom>
+          <a:noFill/>
+          <a:ln>
+            <a:noFill/>
+          </a:ln>
+          <a:extLst>
+            <a:ext uri="{909E8E84-426E-40DD-AFC4-6F175D3DCCD1}">
+              <a14:hiddenFill xmlns:a14="http://schemas.microsoft.com/office/drawing/2010/main">
+                <a:solidFill>
+                  <a:srgbClr val="FFFFFF"/>
+                </a:solidFill>
+              </a14:hiddenFill>
+            </a:ext>
+            <a:ext uri="{91240B29-F687-4F45-9708-019B960494DF}">
+              <a14:hiddenLine xmlns:a14="http://schemas.microsoft.com/office/drawing/2010/main" w="9525">
+                <a:solidFill>
+                  <a:srgbClr val="000000"/>
+                </a:solidFill>
+                <a:miter lim="800000"/>
+                <a:headEnd/>
+                <a:tailEnd/>
+              </a14:hiddenLine>
+            </a:ext>
+          </a:extLst>
+        </p:spPr>
+        <p:txBody>
+          <a:bodyPr wrap="square" lIns="77560" tIns="38780" rIns="77560" bIns="38780">
+            <a:spAutoFit/>
+          </a:bodyPr>
+          <a:lstStyle>
+            <a:lvl1pPr eaLnBrk="0" hangingPunct="0">
+              <a:defRPr sz="2100">
+                <a:solidFill>
+                  <a:schemeClr val="tx1"/>
+                </a:solidFill>
+                <a:latin typeface="tahoma, verdana, arial" charset="0"/>
+                <a:cs typeface="Times New Roman" panose="02020603050405020304" pitchFamily="18" charset="0"/>
+              </a:defRPr>
+            </a:lvl1pPr>
+            <a:lvl2pPr marL="742950" indent="-285750" eaLnBrk="0" hangingPunct="0">
+              <a:defRPr sz="2100">
+                <a:solidFill>
+                  <a:schemeClr val="tx1"/>
+                </a:solidFill>
+                <a:latin typeface="tahoma, verdana, arial" charset="0"/>
+                <a:cs typeface="Times New Roman" panose="02020603050405020304" pitchFamily="18" charset="0"/>
+              </a:defRPr>
+            </a:lvl2pPr>
+            <a:lvl3pPr marL="1143000" indent="-228600" eaLnBrk="0" hangingPunct="0">
+              <a:defRPr sz="2100">
+                <a:solidFill>
+                  <a:schemeClr val="tx1"/>
+                </a:solidFill>
+                <a:latin typeface="tahoma, verdana, arial" charset="0"/>
+                <a:cs typeface="Times New Roman" panose="02020603050405020304" pitchFamily="18" charset="0"/>
+              </a:defRPr>
+            </a:lvl3pPr>
+            <a:lvl4pPr marL="1600200" indent="-228600" eaLnBrk="0" hangingPunct="0">
+              <a:defRPr sz="2100">
+                <a:solidFill>
+                  <a:schemeClr val="tx1"/>
+                </a:solidFill>
+                <a:latin typeface="tahoma, verdana, arial" charset="0"/>
+                <a:cs typeface="Times New Roman" panose="02020603050405020304" pitchFamily="18" charset="0"/>
+              </a:defRPr>
+            </a:lvl4pPr>
+            <a:lvl5pPr marL="2057400" indent="-228600" eaLnBrk="0" hangingPunct="0">
+              <a:defRPr sz="2100">
+                <a:solidFill>
+                  <a:schemeClr val="tx1"/>
+                </a:solidFill>
+                <a:latin typeface="tahoma, verdana, arial" charset="0"/>
+                <a:cs typeface="Times New Roman" panose="02020603050405020304" pitchFamily="18" charset="0"/>
+              </a:defRPr>
+            </a:lvl5pPr>
+            <a:lvl6pPr marL="2514600" indent="-228600" algn="ctr" eaLnBrk="0" fontAlgn="base" hangingPunct="0">
+              <a:spcBef>
+                <a:spcPct val="0"/>
+              </a:spcBef>
+              <a:spcAft>
+                <a:spcPct val="0"/>
+              </a:spcAft>
+              <a:defRPr sz="2100">
+                <a:solidFill>
+                  <a:schemeClr val="tx1"/>
+                </a:solidFill>
+                <a:latin typeface="tahoma, verdana, arial" charset="0"/>
+                <a:cs typeface="Times New Roman" panose="02020603050405020304" pitchFamily="18" charset="0"/>
+              </a:defRPr>
+            </a:lvl6pPr>
+            <a:lvl7pPr marL="2971800" indent="-228600" algn="ctr" eaLnBrk="0" fontAlgn="base" hangingPunct="0">
+              <a:spcBef>
+                <a:spcPct val="0"/>
+              </a:spcBef>
+              <a:spcAft>
+                <a:spcPct val="0"/>
+              </a:spcAft>
+              <a:defRPr sz="2100">
+                <a:solidFill>
+                  <a:schemeClr val="tx1"/>
+                </a:solidFill>
+                <a:latin typeface="tahoma, verdana, arial" charset="0"/>
+                <a:cs typeface="Times New Roman" panose="02020603050405020304" pitchFamily="18" charset="0"/>
+              </a:defRPr>
+            </a:lvl7pPr>
+            <a:lvl8pPr marL="3429000" indent="-228600" algn="ctr" eaLnBrk="0" fontAlgn="base" hangingPunct="0">
+              <a:spcBef>
+                <a:spcPct val="0"/>
+              </a:spcBef>
+              <a:spcAft>
+                <a:spcPct val="0"/>
+              </a:spcAft>
+              <a:defRPr sz="2100">
+                <a:solidFill>
+                  <a:schemeClr val="tx1"/>
+                </a:solidFill>
+                <a:latin typeface="tahoma, verdana, arial" charset="0"/>
+                <a:cs typeface="Times New Roman" panose="02020603050405020304" pitchFamily="18" charset="0"/>
+              </a:defRPr>
+            </a:lvl8pPr>
+            <a:lvl9pPr marL="3886200" indent="-228600" algn="ctr" eaLnBrk="0" fontAlgn="base" hangingPunct="0">
+              <a:spcBef>
+                <a:spcPct val="0"/>
+              </a:spcBef>
+              <a:spcAft>
+                <a:spcPct val="0"/>
+              </a:spcAft>
+              <a:defRPr sz="2100">
+                <a:solidFill>
+                  <a:schemeClr val="tx1"/>
+                </a:solidFill>
+                <a:latin typeface="tahoma, verdana, arial" charset="0"/>
+                <a:cs typeface="Times New Roman" panose="02020603050405020304" pitchFamily="18" charset="0"/>
+              </a:defRPr>
+            </a:lvl9pPr>
+          </a:lstStyle>
+          <a:p>
+            <a:pPr algn="just" eaLnBrk="1" hangingPunct="1"/>
+            <a:r>
+              <a:rPr lang="pt-BR" altLang="pt-BR" sz="3307" dirty="0">
+                <a:latin typeface="Arial" panose="020B0604020202020204" pitchFamily="34" charset="0"/>
+                <a:cs typeface="Arial" panose="020B0604020202020204" pitchFamily="34" charset="0"/>
+              </a:rPr>
+              <a:t>Coleta feita com rede de neblina, perfusão com </a:t>
+            </a:r>
+            <a:r>
+              <a:rPr lang="pt-BR" altLang="pt-BR" sz="3307" dirty="0" err="1">
+                <a:latin typeface="Arial" panose="020B0604020202020204" pitchFamily="34" charset="0"/>
+                <a:cs typeface="Arial" panose="020B0604020202020204" pitchFamily="34" charset="0"/>
+              </a:rPr>
+              <a:t>paraformol</a:t>
+            </a:r>
+            <a:r>
+              <a:rPr lang="pt-BR" altLang="pt-BR" sz="3307" dirty="0">
+                <a:latin typeface="Arial" panose="020B0604020202020204" pitchFamily="34" charset="0"/>
+                <a:cs typeface="Arial" panose="020B0604020202020204" pitchFamily="34" charset="0"/>
+              </a:rPr>
+              <a:t> e RNA Later.</a:t>
+            </a:r>
+          </a:p>
+        </p:txBody>
+      </p:sp>
+      <p:sp>
+        <p:nvSpPr>
+          <p:cNvPr id="24" name="Text Box 21">
+            <a:extLst>
+              <a:ext uri="{FF2B5EF4-FFF2-40B4-BE49-F238E27FC236}">
+                <a16:creationId xmlns:a16="http://schemas.microsoft.com/office/drawing/2014/main" id="{3493AD82-089C-F3CC-B838-602BBB8C1574}"/>
+              </a:ext>
+            </a:extLst>
+          </p:cNvPr>
+          <p:cNvSpPr txBox="1"/>
+          <p:nvPr/>
+        </p:nvSpPr>
+        <p:spPr bwMode="auto">
+          <a:xfrm>
+            <a:off x="13487369" y="17312634"/>
+            <a:ext cx="5999395" cy="1605082"/>
+          </a:xfrm>
+          <a:prstGeom prst="rect">
+            <a:avLst/>
+          </a:prstGeom>
+          <a:noFill/>
+          <a:ln>
+            <a:noFill/>
+          </a:ln>
+          <a:extLst>
+            <a:ext uri="{909E8E84-426E-40DD-AFC4-6F175D3DCCD1}">
+              <a14:hiddenFill xmlns:a14="http://schemas.microsoft.com/office/drawing/2010/main">
+                <a:solidFill>
+                  <a:srgbClr val="FFFFFF"/>
+                </a:solidFill>
+              </a14:hiddenFill>
+            </a:ext>
+            <a:ext uri="{91240B29-F687-4F45-9708-019B960494DF}">
+              <a14:hiddenLine xmlns:a14="http://schemas.microsoft.com/office/drawing/2010/main" w="9525">
+                <a:solidFill>
+                  <a:srgbClr val="000000"/>
+                </a:solidFill>
+                <a:miter lim="800000"/>
+                <a:headEnd/>
+                <a:tailEnd/>
+              </a14:hiddenLine>
+            </a:ext>
+          </a:extLst>
+        </p:spPr>
+        <p:txBody>
+          <a:bodyPr wrap="square" lIns="77560" tIns="38780" rIns="77560" bIns="38780">
+            <a:spAutoFit/>
+          </a:bodyPr>
+          <a:lstStyle>
+            <a:lvl1pPr eaLnBrk="0" hangingPunct="0">
+              <a:defRPr sz="2100">
+                <a:solidFill>
+                  <a:schemeClr val="tx1"/>
+                </a:solidFill>
+                <a:latin typeface="tahoma, verdana, arial" charset="0"/>
+                <a:cs typeface="Times New Roman" panose="02020603050405020304" pitchFamily="18" charset="0"/>
+              </a:defRPr>
+            </a:lvl1pPr>
+            <a:lvl2pPr marL="742950" indent="-285750" eaLnBrk="0" hangingPunct="0">
+              <a:defRPr sz="2100">
+                <a:solidFill>
+                  <a:schemeClr val="tx1"/>
+                </a:solidFill>
+                <a:latin typeface="tahoma, verdana, arial" charset="0"/>
+                <a:cs typeface="Times New Roman" panose="02020603050405020304" pitchFamily="18" charset="0"/>
+              </a:defRPr>
+            </a:lvl2pPr>
+            <a:lvl3pPr marL="1143000" indent="-228600" eaLnBrk="0" hangingPunct="0">
+              <a:defRPr sz="2100">
+                <a:solidFill>
+                  <a:schemeClr val="tx1"/>
+                </a:solidFill>
+                <a:latin typeface="tahoma, verdana, arial" charset="0"/>
+                <a:cs typeface="Times New Roman" panose="02020603050405020304" pitchFamily="18" charset="0"/>
+              </a:defRPr>
+            </a:lvl3pPr>
+            <a:lvl4pPr marL="1600200" indent="-228600" eaLnBrk="0" hangingPunct="0">
+              <a:defRPr sz="2100">
+                <a:solidFill>
+                  <a:schemeClr val="tx1"/>
+                </a:solidFill>
+                <a:latin typeface="tahoma, verdana, arial" charset="0"/>
+                <a:cs typeface="Times New Roman" panose="02020603050405020304" pitchFamily="18" charset="0"/>
+              </a:defRPr>
+            </a:lvl4pPr>
+            <a:lvl5pPr marL="2057400" indent="-228600" eaLnBrk="0" hangingPunct="0">
+              <a:defRPr sz="2100">
+                <a:solidFill>
+                  <a:schemeClr val="tx1"/>
+                </a:solidFill>
+                <a:latin typeface="tahoma, verdana, arial" charset="0"/>
+                <a:cs typeface="Times New Roman" panose="02020603050405020304" pitchFamily="18" charset="0"/>
+              </a:defRPr>
+            </a:lvl5pPr>
+            <a:lvl6pPr marL="2514600" indent="-228600" algn="ctr" eaLnBrk="0" fontAlgn="base" hangingPunct="0">
+              <a:spcBef>
+                <a:spcPct val="0"/>
+              </a:spcBef>
+              <a:spcAft>
+                <a:spcPct val="0"/>
+              </a:spcAft>
+              <a:defRPr sz="2100">
+                <a:solidFill>
+                  <a:schemeClr val="tx1"/>
+                </a:solidFill>
+                <a:latin typeface="tahoma, verdana, arial" charset="0"/>
+                <a:cs typeface="Times New Roman" panose="02020603050405020304" pitchFamily="18" charset="0"/>
+              </a:defRPr>
+            </a:lvl6pPr>
+            <a:lvl7pPr marL="2971800" indent="-228600" algn="ctr" eaLnBrk="0" fontAlgn="base" hangingPunct="0">
+              <a:spcBef>
+                <a:spcPct val="0"/>
+              </a:spcBef>
+              <a:spcAft>
+                <a:spcPct val="0"/>
+              </a:spcAft>
+              <a:defRPr sz="2100">
+                <a:solidFill>
+                  <a:schemeClr val="tx1"/>
+                </a:solidFill>
+                <a:latin typeface="tahoma, verdana, arial" charset="0"/>
+                <a:cs typeface="Times New Roman" panose="02020603050405020304" pitchFamily="18" charset="0"/>
+              </a:defRPr>
+            </a:lvl7pPr>
+            <a:lvl8pPr marL="3429000" indent="-228600" algn="ctr" eaLnBrk="0" fontAlgn="base" hangingPunct="0">
+              <a:spcBef>
+                <a:spcPct val="0"/>
+              </a:spcBef>
+              <a:spcAft>
+                <a:spcPct val="0"/>
+              </a:spcAft>
+              <a:defRPr sz="2100">
+                <a:solidFill>
+                  <a:schemeClr val="tx1"/>
+                </a:solidFill>
+                <a:latin typeface="tahoma, verdana, arial" charset="0"/>
+                <a:cs typeface="Times New Roman" panose="02020603050405020304" pitchFamily="18" charset="0"/>
+              </a:defRPr>
+            </a:lvl8pPr>
+            <a:lvl9pPr marL="3886200" indent="-228600" algn="ctr" eaLnBrk="0" fontAlgn="base" hangingPunct="0">
+              <a:spcBef>
+                <a:spcPct val="0"/>
+              </a:spcBef>
+              <a:spcAft>
+                <a:spcPct val="0"/>
+              </a:spcAft>
+              <a:defRPr sz="2100">
+                <a:solidFill>
+                  <a:schemeClr val="tx1"/>
+                </a:solidFill>
+                <a:latin typeface="tahoma, verdana, arial" charset="0"/>
+                <a:cs typeface="Times New Roman" panose="02020603050405020304" pitchFamily="18" charset="0"/>
+              </a:defRPr>
+            </a:lvl9pPr>
+          </a:lstStyle>
+          <a:p>
+            <a:pPr algn="just" eaLnBrk="1" hangingPunct="1"/>
+            <a:r>
+              <a:rPr lang="pt-BR" altLang="pt-BR" sz="3307" dirty="0">
+                <a:latin typeface="Arial" panose="020B0604020202020204" pitchFamily="34" charset="0"/>
+                <a:cs typeface="Arial" panose="020B0604020202020204" pitchFamily="34" charset="0"/>
+              </a:rPr>
+              <a:t>Feita com cuidado para não danificar o tecido e separar o telencéfalo.</a:t>
+            </a:r>
+          </a:p>
+        </p:txBody>
+      </p:sp>
+      <p:sp>
+        <p:nvSpPr>
+          <p:cNvPr id="25" name="Text Box 21">
+            <a:extLst>
+              <a:ext uri="{FF2B5EF4-FFF2-40B4-BE49-F238E27FC236}">
+                <a16:creationId xmlns:a16="http://schemas.microsoft.com/office/drawing/2014/main" id="{21F21434-DF94-7337-683E-14FAE525399A}"/>
+              </a:ext>
+            </a:extLst>
+          </p:cNvPr>
+          <p:cNvSpPr txBox="1"/>
+          <p:nvPr/>
+        </p:nvSpPr>
+        <p:spPr bwMode="auto">
+          <a:xfrm>
+            <a:off x="13487369" y="20039495"/>
+            <a:ext cx="5999395" cy="1605082"/>
+          </a:xfrm>
+          <a:prstGeom prst="rect">
+            <a:avLst/>
+          </a:prstGeom>
+          <a:noFill/>
+          <a:ln>
+            <a:noFill/>
+          </a:ln>
+          <a:extLst>
+            <a:ext uri="{909E8E84-426E-40DD-AFC4-6F175D3DCCD1}">
+              <a14:hiddenFill xmlns:a14="http://schemas.microsoft.com/office/drawing/2010/main">
+                <a:solidFill>
+                  <a:srgbClr val="FFFFFF"/>
+                </a:solidFill>
+              </a14:hiddenFill>
+            </a:ext>
+            <a:ext uri="{91240B29-F687-4F45-9708-019B960494DF}">
+              <a14:hiddenLine xmlns:a14="http://schemas.microsoft.com/office/drawing/2010/main" w="9525">
+                <a:solidFill>
+                  <a:srgbClr val="000000"/>
+                </a:solidFill>
+                <a:miter lim="800000"/>
+                <a:headEnd/>
+                <a:tailEnd/>
+              </a14:hiddenLine>
+            </a:ext>
+          </a:extLst>
+        </p:spPr>
+        <p:txBody>
+          <a:bodyPr wrap="square" lIns="77560" tIns="38780" rIns="77560" bIns="38780">
+            <a:spAutoFit/>
+          </a:bodyPr>
+          <a:lstStyle>
+            <a:lvl1pPr eaLnBrk="0" hangingPunct="0">
+              <a:defRPr sz="2100">
+                <a:solidFill>
+                  <a:schemeClr val="tx1"/>
+                </a:solidFill>
+                <a:latin typeface="tahoma, verdana, arial" charset="0"/>
+                <a:cs typeface="Times New Roman" panose="02020603050405020304" pitchFamily="18" charset="0"/>
+              </a:defRPr>
+            </a:lvl1pPr>
+            <a:lvl2pPr marL="742950" indent="-285750" eaLnBrk="0" hangingPunct="0">
+              <a:defRPr sz="2100">
+                <a:solidFill>
+                  <a:schemeClr val="tx1"/>
+                </a:solidFill>
+                <a:latin typeface="tahoma, verdana, arial" charset="0"/>
+                <a:cs typeface="Times New Roman" panose="02020603050405020304" pitchFamily="18" charset="0"/>
+              </a:defRPr>
+            </a:lvl2pPr>
+            <a:lvl3pPr marL="1143000" indent="-228600" eaLnBrk="0" hangingPunct="0">
+              <a:defRPr sz="2100">
+                <a:solidFill>
+                  <a:schemeClr val="tx1"/>
+                </a:solidFill>
+                <a:latin typeface="tahoma, verdana, arial" charset="0"/>
+                <a:cs typeface="Times New Roman" panose="02020603050405020304" pitchFamily="18" charset="0"/>
+              </a:defRPr>
+            </a:lvl3pPr>
+            <a:lvl4pPr marL="1600200" indent="-228600" eaLnBrk="0" hangingPunct="0">
+              <a:defRPr sz="2100">
+                <a:solidFill>
+                  <a:schemeClr val="tx1"/>
+                </a:solidFill>
+                <a:latin typeface="tahoma, verdana, arial" charset="0"/>
+                <a:cs typeface="Times New Roman" panose="02020603050405020304" pitchFamily="18" charset="0"/>
+              </a:defRPr>
+            </a:lvl4pPr>
+            <a:lvl5pPr marL="2057400" indent="-228600" eaLnBrk="0" hangingPunct="0">
+              <a:defRPr sz="2100">
+                <a:solidFill>
+                  <a:schemeClr val="tx1"/>
+                </a:solidFill>
+                <a:latin typeface="tahoma, verdana, arial" charset="0"/>
+                <a:cs typeface="Times New Roman" panose="02020603050405020304" pitchFamily="18" charset="0"/>
+              </a:defRPr>
+            </a:lvl5pPr>
+            <a:lvl6pPr marL="2514600" indent="-228600" algn="ctr" eaLnBrk="0" fontAlgn="base" hangingPunct="0">
+              <a:spcBef>
+                <a:spcPct val="0"/>
+              </a:spcBef>
+              <a:spcAft>
+                <a:spcPct val="0"/>
+              </a:spcAft>
+              <a:defRPr sz="2100">
+                <a:solidFill>
+                  <a:schemeClr val="tx1"/>
+                </a:solidFill>
+                <a:latin typeface="tahoma, verdana, arial" charset="0"/>
+                <a:cs typeface="Times New Roman" panose="02020603050405020304" pitchFamily="18" charset="0"/>
+              </a:defRPr>
+            </a:lvl6pPr>
+            <a:lvl7pPr marL="2971800" indent="-228600" algn="ctr" eaLnBrk="0" fontAlgn="base" hangingPunct="0">
+              <a:spcBef>
+                <a:spcPct val="0"/>
+              </a:spcBef>
+              <a:spcAft>
+                <a:spcPct val="0"/>
+              </a:spcAft>
+              <a:defRPr sz="2100">
+                <a:solidFill>
+                  <a:schemeClr val="tx1"/>
+                </a:solidFill>
+                <a:latin typeface="tahoma, verdana, arial" charset="0"/>
+                <a:cs typeface="Times New Roman" panose="02020603050405020304" pitchFamily="18" charset="0"/>
+              </a:defRPr>
+            </a:lvl7pPr>
+            <a:lvl8pPr marL="3429000" indent="-228600" algn="ctr" eaLnBrk="0" fontAlgn="base" hangingPunct="0">
+              <a:spcBef>
+                <a:spcPct val="0"/>
+              </a:spcBef>
+              <a:spcAft>
+                <a:spcPct val="0"/>
+              </a:spcAft>
+              <a:defRPr sz="2100">
+                <a:solidFill>
+                  <a:schemeClr val="tx1"/>
+                </a:solidFill>
+                <a:latin typeface="tahoma, verdana, arial" charset="0"/>
+                <a:cs typeface="Times New Roman" panose="02020603050405020304" pitchFamily="18" charset="0"/>
+              </a:defRPr>
+            </a:lvl8pPr>
+            <a:lvl9pPr marL="3886200" indent="-228600" algn="ctr" eaLnBrk="0" fontAlgn="base" hangingPunct="0">
+              <a:spcBef>
+                <a:spcPct val="0"/>
+              </a:spcBef>
+              <a:spcAft>
+                <a:spcPct val="0"/>
+              </a:spcAft>
+              <a:defRPr sz="2100">
+                <a:solidFill>
+                  <a:schemeClr val="tx1"/>
+                </a:solidFill>
+                <a:latin typeface="tahoma, verdana, arial" charset="0"/>
+                <a:cs typeface="Times New Roman" panose="02020603050405020304" pitchFamily="18" charset="0"/>
+              </a:defRPr>
+            </a:lvl9pPr>
+          </a:lstStyle>
+          <a:p>
+            <a:pPr algn="just" eaLnBrk="1" hangingPunct="1"/>
+            <a:r>
+              <a:rPr lang="pt-BR" altLang="pt-BR" sz="3307" dirty="0">
+                <a:latin typeface="Arial" panose="020B0604020202020204" pitchFamily="34" charset="0"/>
+                <a:cs typeface="Arial" panose="020B0604020202020204" pitchFamily="34" charset="0"/>
+              </a:rPr>
+              <a:t>Protocolo de </a:t>
+            </a:r>
+            <a:r>
+              <a:rPr lang="pt-BR" altLang="pt-BR" sz="3307" dirty="0" err="1">
+                <a:latin typeface="Arial" panose="020B0604020202020204" pitchFamily="34" charset="0"/>
+                <a:cs typeface="Arial" panose="020B0604020202020204" pitchFamily="34" charset="0"/>
+              </a:rPr>
+              <a:t>TRIzolTM</a:t>
+            </a:r>
+            <a:r>
+              <a:rPr lang="pt-BR" altLang="pt-BR" sz="3307" dirty="0">
+                <a:latin typeface="Arial" panose="020B0604020202020204" pitchFamily="34" charset="0"/>
+                <a:cs typeface="Arial" panose="020B0604020202020204" pitchFamily="34" charset="0"/>
+              </a:rPr>
+              <a:t>. Purificação do mRNA e posterior conversão em </a:t>
+            </a:r>
+            <a:r>
+              <a:rPr lang="pt-BR" altLang="pt-BR" sz="3307" dirty="0" err="1">
+                <a:latin typeface="Arial" panose="020B0604020202020204" pitchFamily="34" charset="0"/>
+                <a:cs typeface="Arial" panose="020B0604020202020204" pitchFamily="34" charset="0"/>
+              </a:rPr>
+              <a:t>cDNA</a:t>
+            </a:r>
+            <a:r>
+              <a:rPr lang="pt-BR" altLang="pt-BR" sz="3307" dirty="0">
+                <a:latin typeface="Arial" panose="020B0604020202020204" pitchFamily="34" charset="0"/>
+                <a:cs typeface="Arial" panose="020B0604020202020204" pitchFamily="34" charset="0"/>
+              </a:rPr>
+              <a:t>.</a:t>
+            </a:r>
+          </a:p>
+        </p:txBody>
+      </p:sp>
+      <p:sp>
+        <p:nvSpPr>
+          <p:cNvPr id="26" name="Text Box 21">
+            <a:extLst>
+              <a:ext uri="{FF2B5EF4-FFF2-40B4-BE49-F238E27FC236}">
+                <a16:creationId xmlns:a16="http://schemas.microsoft.com/office/drawing/2014/main" id="{6900221A-208F-934E-4FC2-89F89D917E89}"/>
+              </a:ext>
+            </a:extLst>
+          </p:cNvPr>
+          <p:cNvSpPr txBox="1"/>
+          <p:nvPr/>
+        </p:nvSpPr>
+        <p:spPr bwMode="auto">
+          <a:xfrm>
+            <a:off x="13484815" y="22766357"/>
+            <a:ext cx="5999395" cy="1605082"/>
+          </a:xfrm>
+          <a:prstGeom prst="rect">
+            <a:avLst/>
+          </a:prstGeom>
+          <a:noFill/>
+          <a:ln>
+            <a:noFill/>
+          </a:ln>
+          <a:extLst>
+            <a:ext uri="{909E8E84-426E-40DD-AFC4-6F175D3DCCD1}">
+              <a14:hiddenFill xmlns:a14="http://schemas.microsoft.com/office/drawing/2010/main">
+                <a:solidFill>
+                  <a:srgbClr val="FFFFFF"/>
+                </a:solidFill>
+              </a14:hiddenFill>
+            </a:ext>
+            <a:ext uri="{91240B29-F687-4F45-9708-019B960494DF}">
+              <a14:hiddenLine xmlns:a14="http://schemas.microsoft.com/office/drawing/2010/main" w="9525">
+                <a:solidFill>
+                  <a:srgbClr val="000000"/>
+                </a:solidFill>
+                <a:miter lim="800000"/>
+                <a:headEnd/>
+                <a:tailEnd/>
+              </a14:hiddenLine>
+            </a:ext>
+          </a:extLst>
+        </p:spPr>
+        <p:txBody>
+          <a:bodyPr wrap="square" lIns="77560" tIns="38780" rIns="77560" bIns="38780">
+            <a:spAutoFit/>
+          </a:bodyPr>
+          <a:lstStyle>
+            <a:lvl1pPr eaLnBrk="0" hangingPunct="0">
+              <a:defRPr sz="2100">
+                <a:solidFill>
+                  <a:schemeClr val="tx1"/>
+                </a:solidFill>
+                <a:latin typeface="tahoma, verdana, arial" charset="0"/>
+                <a:cs typeface="Times New Roman" panose="02020603050405020304" pitchFamily="18" charset="0"/>
+              </a:defRPr>
+            </a:lvl1pPr>
+            <a:lvl2pPr marL="742950" indent="-285750" eaLnBrk="0" hangingPunct="0">
+              <a:defRPr sz="2100">
+                <a:solidFill>
+                  <a:schemeClr val="tx1"/>
+                </a:solidFill>
+                <a:latin typeface="tahoma, verdana, arial" charset="0"/>
+                <a:cs typeface="Times New Roman" panose="02020603050405020304" pitchFamily="18" charset="0"/>
+              </a:defRPr>
+            </a:lvl2pPr>
+            <a:lvl3pPr marL="1143000" indent="-228600" eaLnBrk="0" hangingPunct="0">
+              <a:defRPr sz="2100">
+                <a:solidFill>
+                  <a:schemeClr val="tx1"/>
+                </a:solidFill>
+                <a:latin typeface="tahoma, verdana, arial" charset="0"/>
+                <a:cs typeface="Times New Roman" panose="02020603050405020304" pitchFamily="18" charset="0"/>
+              </a:defRPr>
+            </a:lvl3pPr>
+            <a:lvl4pPr marL="1600200" indent="-228600" eaLnBrk="0" hangingPunct="0">
+              <a:defRPr sz="2100">
+                <a:solidFill>
+                  <a:schemeClr val="tx1"/>
+                </a:solidFill>
+                <a:latin typeface="tahoma, verdana, arial" charset="0"/>
+                <a:cs typeface="Times New Roman" panose="02020603050405020304" pitchFamily="18" charset="0"/>
+              </a:defRPr>
+            </a:lvl4pPr>
+            <a:lvl5pPr marL="2057400" indent="-228600" eaLnBrk="0" hangingPunct="0">
+              <a:defRPr sz="2100">
+                <a:solidFill>
+                  <a:schemeClr val="tx1"/>
+                </a:solidFill>
+                <a:latin typeface="tahoma, verdana, arial" charset="0"/>
+                <a:cs typeface="Times New Roman" panose="02020603050405020304" pitchFamily="18" charset="0"/>
+              </a:defRPr>
+            </a:lvl5pPr>
+            <a:lvl6pPr marL="2514600" indent="-228600" algn="ctr" eaLnBrk="0" fontAlgn="base" hangingPunct="0">
+              <a:spcBef>
+                <a:spcPct val="0"/>
+              </a:spcBef>
+              <a:spcAft>
+                <a:spcPct val="0"/>
+              </a:spcAft>
+              <a:defRPr sz="2100">
+                <a:solidFill>
+                  <a:schemeClr val="tx1"/>
+                </a:solidFill>
+                <a:latin typeface="tahoma, verdana, arial" charset="0"/>
+                <a:cs typeface="Times New Roman" panose="02020603050405020304" pitchFamily="18" charset="0"/>
+              </a:defRPr>
+            </a:lvl6pPr>
+            <a:lvl7pPr marL="2971800" indent="-228600" algn="ctr" eaLnBrk="0" fontAlgn="base" hangingPunct="0">
+              <a:spcBef>
+                <a:spcPct val="0"/>
+              </a:spcBef>
+              <a:spcAft>
+                <a:spcPct val="0"/>
+              </a:spcAft>
+              <a:defRPr sz="2100">
+                <a:solidFill>
+                  <a:schemeClr val="tx1"/>
+                </a:solidFill>
+                <a:latin typeface="tahoma, verdana, arial" charset="0"/>
+                <a:cs typeface="Times New Roman" panose="02020603050405020304" pitchFamily="18" charset="0"/>
+              </a:defRPr>
+            </a:lvl7pPr>
+            <a:lvl8pPr marL="3429000" indent="-228600" algn="ctr" eaLnBrk="0" fontAlgn="base" hangingPunct="0">
+              <a:spcBef>
+                <a:spcPct val="0"/>
+              </a:spcBef>
+              <a:spcAft>
+                <a:spcPct val="0"/>
+              </a:spcAft>
+              <a:defRPr sz="2100">
+                <a:solidFill>
+                  <a:schemeClr val="tx1"/>
+                </a:solidFill>
+                <a:latin typeface="tahoma, verdana, arial" charset="0"/>
+                <a:cs typeface="Times New Roman" panose="02020603050405020304" pitchFamily="18" charset="0"/>
+              </a:defRPr>
+            </a:lvl8pPr>
+            <a:lvl9pPr marL="3886200" indent="-228600" algn="ctr" eaLnBrk="0" fontAlgn="base" hangingPunct="0">
+              <a:spcBef>
+                <a:spcPct val="0"/>
+              </a:spcBef>
+              <a:spcAft>
+                <a:spcPct val="0"/>
+              </a:spcAft>
+              <a:defRPr sz="2100">
+                <a:solidFill>
+                  <a:schemeClr val="tx1"/>
+                </a:solidFill>
+                <a:latin typeface="tahoma, verdana, arial" charset="0"/>
+                <a:cs typeface="Times New Roman" panose="02020603050405020304" pitchFamily="18" charset="0"/>
+              </a:defRPr>
+            </a:lvl9pPr>
+          </a:lstStyle>
+          <a:p>
+            <a:pPr algn="just" eaLnBrk="1" hangingPunct="1"/>
+            <a:r>
+              <a:rPr lang="pt-BR" altLang="pt-BR" sz="3307" dirty="0">
+                <a:latin typeface="Arial" panose="020B0604020202020204" pitchFamily="34" charset="0"/>
+                <a:cs typeface="Arial" panose="020B0604020202020204" pitchFamily="34" charset="0"/>
+              </a:rPr>
+              <a:t>Ion Chef, Ion 540TM Chip e Ion S5 </a:t>
+            </a:r>
+            <a:r>
+              <a:rPr lang="pt-BR" altLang="pt-BR" sz="3307" dirty="0" err="1">
+                <a:latin typeface="Arial" panose="020B0604020202020204" pitchFamily="34" charset="0"/>
+                <a:cs typeface="Arial" panose="020B0604020202020204" pitchFamily="34" charset="0"/>
+              </a:rPr>
+              <a:t>GeneStudio</a:t>
+            </a:r>
+            <a:r>
+              <a:rPr lang="pt-BR" altLang="pt-BR" sz="3307" dirty="0">
+                <a:latin typeface="Arial" panose="020B0604020202020204" pitchFamily="34" charset="0"/>
+                <a:cs typeface="Arial" panose="020B0604020202020204" pitchFamily="34" charset="0"/>
+              </a:rPr>
+              <a:t> System.</a:t>
+            </a:r>
+          </a:p>
+          <a:p>
+            <a:pPr algn="just" eaLnBrk="1" hangingPunct="1"/>
+            <a:r>
+              <a:rPr lang="pt-BR" altLang="pt-BR" sz="3307" dirty="0">
+                <a:latin typeface="Arial" panose="020B0604020202020204" pitchFamily="34" charset="0"/>
+                <a:cs typeface="Arial" panose="020B0604020202020204" pitchFamily="34" charset="0"/>
+              </a:rPr>
+              <a:t>Arquivos FASTQ.</a:t>
+            </a:r>
+          </a:p>
+        </p:txBody>
+      </p:sp>
+      <p:sp>
+        <p:nvSpPr>
+          <p:cNvPr id="27" name="Text Box 21">
+            <a:extLst>
+              <a:ext uri="{FF2B5EF4-FFF2-40B4-BE49-F238E27FC236}">
+                <a16:creationId xmlns:a16="http://schemas.microsoft.com/office/drawing/2014/main" id="{D92E1F51-1C7A-AD3E-7FC6-B12725808C10}"/>
+              </a:ext>
+            </a:extLst>
+          </p:cNvPr>
+          <p:cNvSpPr txBox="1"/>
+          <p:nvPr/>
+        </p:nvSpPr>
+        <p:spPr bwMode="auto">
+          <a:xfrm>
+            <a:off x="13484814" y="25359008"/>
+            <a:ext cx="5801800" cy="2114003"/>
+          </a:xfrm>
+          <a:prstGeom prst="rect">
+            <a:avLst/>
+          </a:prstGeom>
+          <a:noFill/>
+          <a:ln>
+            <a:noFill/>
+          </a:ln>
+          <a:extLst>
+            <a:ext uri="{909E8E84-426E-40DD-AFC4-6F175D3DCCD1}">
+              <a14:hiddenFill xmlns:a14="http://schemas.microsoft.com/office/drawing/2010/main">
+                <a:solidFill>
+                  <a:srgbClr val="FFFFFF"/>
+                </a:solidFill>
+              </a14:hiddenFill>
+            </a:ext>
+            <a:ext uri="{91240B29-F687-4F45-9708-019B960494DF}">
+              <a14:hiddenLine xmlns:a14="http://schemas.microsoft.com/office/drawing/2010/main" w="9525">
+                <a:solidFill>
+                  <a:srgbClr val="000000"/>
+                </a:solidFill>
+                <a:miter lim="800000"/>
+                <a:headEnd/>
+                <a:tailEnd/>
+              </a14:hiddenLine>
+            </a:ext>
+          </a:extLst>
+        </p:spPr>
+        <p:txBody>
+          <a:bodyPr wrap="square" lIns="77560" tIns="38780" rIns="77560" bIns="38780">
+            <a:spAutoFit/>
+          </a:bodyPr>
+          <a:lstStyle>
+            <a:lvl1pPr eaLnBrk="0" hangingPunct="0">
+              <a:defRPr sz="2100">
+                <a:solidFill>
+                  <a:schemeClr val="tx1"/>
+                </a:solidFill>
+                <a:latin typeface="tahoma, verdana, arial" charset="0"/>
+                <a:cs typeface="Times New Roman" panose="02020603050405020304" pitchFamily="18" charset="0"/>
+              </a:defRPr>
+            </a:lvl1pPr>
+            <a:lvl2pPr marL="742950" indent="-285750" eaLnBrk="0" hangingPunct="0">
+              <a:defRPr sz="2100">
+                <a:solidFill>
+                  <a:schemeClr val="tx1"/>
+                </a:solidFill>
+                <a:latin typeface="tahoma, verdana, arial" charset="0"/>
+                <a:cs typeface="Times New Roman" panose="02020603050405020304" pitchFamily="18" charset="0"/>
+              </a:defRPr>
+            </a:lvl2pPr>
+            <a:lvl3pPr marL="1143000" indent="-228600" eaLnBrk="0" hangingPunct="0">
+              <a:defRPr sz="2100">
+                <a:solidFill>
+                  <a:schemeClr val="tx1"/>
+                </a:solidFill>
+                <a:latin typeface="tahoma, verdana, arial" charset="0"/>
+                <a:cs typeface="Times New Roman" panose="02020603050405020304" pitchFamily="18" charset="0"/>
+              </a:defRPr>
+            </a:lvl3pPr>
+            <a:lvl4pPr marL="1600200" indent="-228600" eaLnBrk="0" hangingPunct="0">
+              <a:defRPr sz="2100">
+                <a:solidFill>
+                  <a:schemeClr val="tx1"/>
+                </a:solidFill>
+                <a:latin typeface="tahoma, verdana, arial" charset="0"/>
+                <a:cs typeface="Times New Roman" panose="02020603050405020304" pitchFamily="18" charset="0"/>
+              </a:defRPr>
+            </a:lvl4pPr>
+            <a:lvl5pPr marL="2057400" indent="-228600" eaLnBrk="0" hangingPunct="0">
+              <a:defRPr sz="2100">
+                <a:solidFill>
+                  <a:schemeClr val="tx1"/>
+                </a:solidFill>
+                <a:latin typeface="tahoma, verdana, arial" charset="0"/>
+                <a:cs typeface="Times New Roman" panose="02020603050405020304" pitchFamily="18" charset="0"/>
+              </a:defRPr>
+            </a:lvl5pPr>
+            <a:lvl6pPr marL="2514600" indent="-228600" algn="ctr" eaLnBrk="0" fontAlgn="base" hangingPunct="0">
+              <a:spcBef>
+                <a:spcPct val="0"/>
+              </a:spcBef>
+              <a:spcAft>
+                <a:spcPct val="0"/>
+              </a:spcAft>
+              <a:defRPr sz="2100">
+                <a:solidFill>
+                  <a:schemeClr val="tx1"/>
+                </a:solidFill>
+                <a:latin typeface="tahoma, verdana, arial" charset="0"/>
+                <a:cs typeface="Times New Roman" panose="02020603050405020304" pitchFamily="18" charset="0"/>
+              </a:defRPr>
+            </a:lvl6pPr>
+            <a:lvl7pPr marL="2971800" indent="-228600" algn="ctr" eaLnBrk="0" fontAlgn="base" hangingPunct="0">
+              <a:spcBef>
+                <a:spcPct val="0"/>
+              </a:spcBef>
+              <a:spcAft>
+                <a:spcPct val="0"/>
+              </a:spcAft>
+              <a:defRPr sz="2100">
+                <a:solidFill>
+                  <a:schemeClr val="tx1"/>
+                </a:solidFill>
+                <a:latin typeface="tahoma, verdana, arial" charset="0"/>
+                <a:cs typeface="Times New Roman" panose="02020603050405020304" pitchFamily="18" charset="0"/>
+              </a:defRPr>
+            </a:lvl7pPr>
+            <a:lvl8pPr marL="3429000" indent="-228600" algn="ctr" eaLnBrk="0" fontAlgn="base" hangingPunct="0">
+              <a:spcBef>
+                <a:spcPct val="0"/>
+              </a:spcBef>
+              <a:spcAft>
+                <a:spcPct val="0"/>
+              </a:spcAft>
+              <a:defRPr sz="2100">
+                <a:solidFill>
+                  <a:schemeClr val="tx1"/>
+                </a:solidFill>
+                <a:latin typeface="tahoma, verdana, arial" charset="0"/>
+                <a:cs typeface="Times New Roman" panose="02020603050405020304" pitchFamily="18" charset="0"/>
+              </a:defRPr>
+            </a:lvl8pPr>
+            <a:lvl9pPr marL="3886200" indent="-228600" algn="ctr" eaLnBrk="0" fontAlgn="base" hangingPunct="0">
+              <a:spcBef>
+                <a:spcPct val="0"/>
+              </a:spcBef>
+              <a:spcAft>
+                <a:spcPct val="0"/>
+              </a:spcAft>
+              <a:defRPr sz="2100">
+                <a:solidFill>
+                  <a:schemeClr val="tx1"/>
+                </a:solidFill>
+                <a:latin typeface="tahoma, verdana, arial" charset="0"/>
+                <a:cs typeface="Times New Roman" panose="02020603050405020304" pitchFamily="18" charset="0"/>
+              </a:defRPr>
+            </a:lvl9pPr>
+          </a:lstStyle>
+          <a:p>
+            <a:pPr algn="just" eaLnBrk="1" hangingPunct="1"/>
+            <a:r>
+              <a:rPr lang="pt-BR" altLang="pt-BR" sz="3307" dirty="0">
+                <a:latin typeface="Arial" panose="020B0604020202020204" pitchFamily="34" charset="0"/>
+                <a:cs typeface="Arial" panose="020B0604020202020204" pitchFamily="34" charset="0"/>
+              </a:rPr>
+              <a:t>Software FASTQC.</a:t>
+            </a:r>
+          </a:p>
+          <a:p>
+            <a:pPr algn="just" eaLnBrk="1" hangingPunct="1"/>
+            <a:r>
+              <a:rPr lang="pt-BR" altLang="pt-BR" sz="3307" dirty="0">
+                <a:latin typeface="Arial" panose="020B0604020202020204" pitchFamily="34" charset="0"/>
+                <a:cs typeface="Arial" panose="020B0604020202020204" pitchFamily="34" charset="0"/>
+              </a:rPr>
+              <a:t>Software </a:t>
+            </a:r>
+            <a:r>
+              <a:rPr lang="pt-BR" altLang="pt-BR" sz="3307" dirty="0" err="1">
+                <a:latin typeface="Arial" panose="020B0604020202020204" pitchFamily="34" charset="0"/>
+                <a:cs typeface="Arial" panose="020B0604020202020204" pitchFamily="34" charset="0"/>
+              </a:rPr>
+              <a:t>Trimmomatic</a:t>
+            </a:r>
+            <a:r>
+              <a:rPr lang="pt-BR" altLang="pt-BR" sz="3307" dirty="0">
+                <a:latin typeface="Arial" panose="020B0604020202020204" pitchFamily="34" charset="0"/>
+                <a:cs typeface="Arial" panose="020B0604020202020204" pitchFamily="34" charset="0"/>
+              </a:rPr>
+              <a:t>.</a:t>
+            </a:r>
+          </a:p>
+          <a:p>
+            <a:pPr algn="just" eaLnBrk="1" hangingPunct="1"/>
+            <a:r>
+              <a:rPr lang="pt-BR" altLang="pt-BR" sz="3307" dirty="0">
+                <a:latin typeface="Arial" panose="020B0604020202020204" pitchFamily="34" charset="0"/>
+                <a:cs typeface="Arial" panose="020B0604020202020204" pitchFamily="34" charset="0"/>
+              </a:rPr>
+              <a:t>Tabela PHREAD.</a:t>
+            </a:r>
+          </a:p>
+          <a:p>
+            <a:pPr algn="just" eaLnBrk="1" hangingPunct="1"/>
+            <a:endParaRPr lang="pt-BR" altLang="pt-BR" sz="3307" dirty="0">
+              <a:latin typeface="Arial" panose="020B0604020202020204" pitchFamily="34" charset="0"/>
+              <a:cs typeface="Arial" panose="020B0604020202020204" pitchFamily="34" charset="0"/>
+            </a:endParaRPr>
+          </a:p>
+        </p:txBody>
+      </p:sp>
+      <p:sp>
+        <p:nvSpPr>
+          <p:cNvPr id="28" name="Text Box 21">
+            <a:extLst>
+              <a:ext uri="{FF2B5EF4-FFF2-40B4-BE49-F238E27FC236}">
+                <a16:creationId xmlns:a16="http://schemas.microsoft.com/office/drawing/2014/main" id="{4F81C08F-CA77-CB0C-A4AF-3BE1315E1F65}"/>
+              </a:ext>
+            </a:extLst>
+          </p:cNvPr>
+          <p:cNvSpPr txBox="1"/>
+          <p:nvPr/>
+        </p:nvSpPr>
+        <p:spPr bwMode="auto">
+          <a:xfrm>
+            <a:off x="13543372" y="28184360"/>
+            <a:ext cx="5999395" cy="1605082"/>
+          </a:xfrm>
+          <a:prstGeom prst="rect">
+            <a:avLst/>
+          </a:prstGeom>
+          <a:noFill/>
+          <a:ln>
+            <a:noFill/>
+          </a:ln>
+          <a:extLst>
+            <a:ext uri="{909E8E84-426E-40DD-AFC4-6F175D3DCCD1}">
+              <a14:hiddenFill xmlns:a14="http://schemas.microsoft.com/office/drawing/2010/main">
+                <a:solidFill>
+                  <a:srgbClr val="FFFFFF"/>
+                </a:solidFill>
+              </a14:hiddenFill>
+            </a:ext>
+            <a:ext uri="{91240B29-F687-4F45-9708-019B960494DF}">
+              <a14:hiddenLine xmlns:a14="http://schemas.microsoft.com/office/drawing/2010/main" w="9525">
+                <a:solidFill>
+                  <a:srgbClr val="000000"/>
+                </a:solidFill>
+                <a:miter lim="800000"/>
+                <a:headEnd/>
+                <a:tailEnd/>
+              </a14:hiddenLine>
+            </a:ext>
+          </a:extLst>
+        </p:spPr>
+        <p:txBody>
+          <a:bodyPr wrap="square" lIns="77560" tIns="38780" rIns="77560" bIns="38780">
+            <a:spAutoFit/>
+          </a:bodyPr>
+          <a:lstStyle>
+            <a:lvl1pPr eaLnBrk="0" hangingPunct="0">
+              <a:defRPr sz="2100">
+                <a:solidFill>
+                  <a:schemeClr val="tx1"/>
+                </a:solidFill>
+                <a:latin typeface="tahoma, verdana, arial" charset="0"/>
+                <a:cs typeface="Times New Roman" panose="02020603050405020304" pitchFamily="18" charset="0"/>
+              </a:defRPr>
+            </a:lvl1pPr>
+            <a:lvl2pPr marL="742950" indent="-285750" eaLnBrk="0" hangingPunct="0">
+              <a:defRPr sz="2100">
+                <a:solidFill>
+                  <a:schemeClr val="tx1"/>
+                </a:solidFill>
+                <a:latin typeface="tahoma, verdana, arial" charset="0"/>
+                <a:cs typeface="Times New Roman" panose="02020603050405020304" pitchFamily="18" charset="0"/>
+              </a:defRPr>
+            </a:lvl2pPr>
+            <a:lvl3pPr marL="1143000" indent="-228600" eaLnBrk="0" hangingPunct="0">
+              <a:defRPr sz="2100">
+                <a:solidFill>
+                  <a:schemeClr val="tx1"/>
+                </a:solidFill>
+                <a:latin typeface="tahoma, verdana, arial" charset="0"/>
+                <a:cs typeface="Times New Roman" panose="02020603050405020304" pitchFamily="18" charset="0"/>
+              </a:defRPr>
+            </a:lvl3pPr>
+            <a:lvl4pPr marL="1600200" indent="-228600" eaLnBrk="0" hangingPunct="0">
+              <a:defRPr sz="2100">
+                <a:solidFill>
+                  <a:schemeClr val="tx1"/>
+                </a:solidFill>
+                <a:latin typeface="tahoma, verdana, arial" charset="0"/>
+                <a:cs typeface="Times New Roman" panose="02020603050405020304" pitchFamily="18" charset="0"/>
+              </a:defRPr>
+            </a:lvl4pPr>
+            <a:lvl5pPr marL="2057400" indent="-228600" eaLnBrk="0" hangingPunct="0">
+              <a:defRPr sz="2100">
+                <a:solidFill>
+                  <a:schemeClr val="tx1"/>
+                </a:solidFill>
+                <a:latin typeface="tahoma, verdana, arial" charset="0"/>
+                <a:cs typeface="Times New Roman" panose="02020603050405020304" pitchFamily="18" charset="0"/>
+              </a:defRPr>
+            </a:lvl5pPr>
+            <a:lvl6pPr marL="2514600" indent="-228600" algn="ctr" eaLnBrk="0" fontAlgn="base" hangingPunct="0">
+              <a:spcBef>
+                <a:spcPct val="0"/>
+              </a:spcBef>
+              <a:spcAft>
+                <a:spcPct val="0"/>
+              </a:spcAft>
+              <a:defRPr sz="2100">
+                <a:solidFill>
+                  <a:schemeClr val="tx1"/>
+                </a:solidFill>
+                <a:latin typeface="tahoma, verdana, arial" charset="0"/>
+                <a:cs typeface="Times New Roman" panose="02020603050405020304" pitchFamily="18" charset="0"/>
+              </a:defRPr>
+            </a:lvl6pPr>
+            <a:lvl7pPr marL="2971800" indent="-228600" algn="ctr" eaLnBrk="0" fontAlgn="base" hangingPunct="0">
+              <a:spcBef>
+                <a:spcPct val="0"/>
+              </a:spcBef>
+              <a:spcAft>
+                <a:spcPct val="0"/>
+              </a:spcAft>
+              <a:defRPr sz="2100">
+                <a:solidFill>
+                  <a:schemeClr val="tx1"/>
+                </a:solidFill>
+                <a:latin typeface="tahoma, verdana, arial" charset="0"/>
+                <a:cs typeface="Times New Roman" panose="02020603050405020304" pitchFamily="18" charset="0"/>
+              </a:defRPr>
+            </a:lvl7pPr>
+            <a:lvl8pPr marL="3429000" indent="-228600" algn="ctr" eaLnBrk="0" fontAlgn="base" hangingPunct="0">
+              <a:spcBef>
+                <a:spcPct val="0"/>
+              </a:spcBef>
+              <a:spcAft>
+                <a:spcPct val="0"/>
+              </a:spcAft>
+              <a:defRPr sz="2100">
+                <a:solidFill>
+                  <a:schemeClr val="tx1"/>
+                </a:solidFill>
+                <a:latin typeface="tahoma, verdana, arial" charset="0"/>
+                <a:cs typeface="Times New Roman" panose="02020603050405020304" pitchFamily="18" charset="0"/>
+              </a:defRPr>
+            </a:lvl8pPr>
+            <a:lvl9pPr marL="3886200" indent="-228600" algn="ctr" eaLnBrk="0" fontAlgn="base" hangingPunct="0">
+              <a:spcBef>
+                <a:spcPct val="0"/>
+              </a:spcBef>
+              <a:spcAft>
+                <a:spcPct val="0"/>
+              </a:spcAft>
+              <a:defRPr sz="2100">
+                <a:solidFill>
+                  <a:schemeClr val="tx1"/>
+                </a:solidFill>
+                <a:latin typeface="tahoma, verdana, arial" charset="0"/>
+                <a:cs typeface="Times New Roman" panose="02020603050405020304" pitchFamily="18" charset="0"/>
+              </a:defRPr>
+            </a:lvl9pPr>
+          </a:lstStyle>
+          <a:p>
+            <a:pPr algn="just" eaLnBrk="1" hangingPunct="1"/>
+            <a:r>
+              <a:rPr lang="pt-BR" altLang="pt-BR" sz="3307" dirty="0">
+                <a:latin typeface="Arial" panose="020B0604020202020204" pitchFamily="34" charset="0"/>
+                <a:cs typeface="Arial" panose="020B0604020202020204" pitchFamily="34" charset="0"/>
+              </a:rPr>
+              <a:t>Leitura VIRTUS2.</a:t>
+            </a:r>
+          </a:p>
+          <a:p>
+            <a:pPr algn="just" eaLnBrk="1" hangingPunct="1"/>
+            <a:r>
+              <a:rPr lang="pt-BR" altLang="pt-BR" sz="3307" dirty="0">
+                <a:latin typeface="Arial" panose="020B0604020202020204" pitchFamily="34" charset="0"/>
+                <a:cs typeface="Arial" panose="020B0604020202020204" pitchFamily="34" charset="0"/>
+              </a:rPr>
+              <a:t>Banco de dados NCBI.</a:t>
+            </a:r>
+          </a:p>
+          <a:p>
+            <a:pPr algn="just" eaLnBrk="1" hangingPunct="1"/>
+            <a:r>
+              <a:rPr lang="pt-BR" altLang="pt-BR" sz="3307" dirty="0">
+                <a:latin typeface="Arial" panose="020B0604020202020204" pitchFamily="34" charset="0"/>
+                <a:cs typeface="Arial" panose="020B0604020202020204" pitchFamily="34" charset="0"/>
+              </a:rPr>
+              <a:t>Leitura VIRTUS1.</a:t>
+            </a:r>
+          </a:p>
+        </p:txBody>
+      </p:sp>
+      <p:pic>
+        <p:nvPicPr>
+          <p:cNvPr id="42" name="Imagem 41">
+            <a:extLst>
+              <a:ext uri="{FF2B5EF4-FFF2-40B4-BE49-F238E27FC236}">
+                <a16:creationId xmlns:a16="http://schemas.microsoft.com/office/drawing/2014/main" id="{9ED7BB71-10F2-75A0-DCD4-7CACD50D63CB}"/>
               </a:ext>
             </a:extLst>
           </p:cNvPr>
@@ -7136,1304 +8414,20 @@
         </p:blipFill>
         <p:spPr>
           <a:xfrm>
-            <a:off x="748865" y="28312954"/>
-            <a:ext cx="10205776" cy="4076910"/>
+            <a:off x="21406007" y="13234286"/>
+            <a:ext cx="10436003" cy="7069511"/>
           </a:xfrm>
           <a:prstGeom prst="rect">
             <a:avLst/>
           </a:prstGeom>
         </p:spPr>
       </p:pic>
-      <p:sp>
-        <p:nvSpPr>
-          <p:cNvPr id="15" name="CaixaDeTexto 14">
+      <p:pic>
+        <p:nvPicPr>
+          <p:cNvPr id="3" name="Imagem 2" descr="Código QR&#10;&#10;Descrição gerada automaticamente">
             <a:extLst>
               <a:ext uri="{FF2B5EF4-FFF2-40B4-BE49-F238E27FC236}">
-                <a16:creationId xmlns:a16="http://schemas.microsoft.com/office/drawing/2014/main" id="{D3F2F037-4496-CD16-5AE0-648588DC7DF7}"/>
-              </a:ext>
-            </a:extLst>
-          </p:cNvPr>
-          <p:cNvSpPr txBox="1"/>
-          <p:nvPr/>
-        </p:nvSpPr>
-        <p:spPr>
-          <a:xfrm>
-            <a:off x="724546" y="32681709"/>
-            <a:ext cx="10100038" cy="1619098"/>
-          </a:xfrm>
-          <a:prstGeom prst="rect">
-            <a:avLst/>
-          </a:prstGeom>
-          <a:noFill/>
-        </p:spPr>
-        <p:txBody>
-          <a:bodyPr wrap="square" rtlCol="0">
-            <a:spAutoFit/>
-          </a:bodyPr>
-          <a:lstStyle/>
-          <a:p>
-            <a:pPr algn="l"/>
-            <a:r>
-              <a:rPr lang="pt-BR" sz="3307" b="1" dirty="0">
-                <a:latin typeface="Arial" panose="020B0604020202020204" pitchFamily="34" charset="0"/>
-                <a:cs typeface="Arial" panose="020B0604020202020204" pitchFamily="34" charset="0"/>
-              </a:rPr>
-              <a:t>Figura 1</a:t>
-            </a:r>
-            <a:r>
-              <a:rPr lang="en-US" sz="3307" b="1" dirty="0">
-                <a:latin typeface="Arial" panose="020B0604020202020204" pitchFamily="34" charset="0"/>
-                <a:cs typeface="Arial" panose="020B0604020202020204" pitchFamily="34" charset="0"/>
-              </a:rPr>
-              <a:t>- </a:t>
-            </a:r>
-            <a:r>
-              <a:rPr lang="pt-BR" sz="3307" i="1" dirty="0" err="1">
-                <a:latin typeface="Arial" panose="020B0604020202020204" pitchFamily="34" charset="0"/>
-                <a:cs typeface="Arial" panose="020B0604020202020204" pitchFamily="34" charset="0"/>
-              </a:rPr>
-              <a:t>Actitis</a:t>
-            </a:r>
-            <a:r>
-              <a:rPr lang="pt-BR" sz="3307" i="1" dirty="0">
-                <a:latin typeface="Arial" panose="020B0604020202020204" pitchFamily="34" charset="0"/>
-                <a:cs typeface="Arial" panose="020B0604020202020204" pitchFamily="34" charset="0"/>
-              </a:rPr>
-              <a:t> </a:t>
-            </a:r>
-            <a:r>
-              <a:rPr lang="pt-BR" sz="3307" i="1" dirty="0" err="1">
-                <a:latin typeface="Arial" panose="020B0604020202020204" pitchFamily="34" charset="0"/>
-                <a:cs typeface="Arial" panose="020B0604020202020204" pitchFamily="34" charset="0"/>
-              </a:rPr>
-              <a:t>macularius</a:t>
-            </a:r>
-            <a:r>
-              <a:rPr lang="pt-BR" sz="3307" dirty="0">
-                <a:latin typeface="Arial" panose="020B0604020202020204" pitchFamily="34" charset="0"/>
-                <a:cs typeface="Arial" panose="020B0604020202020204" pitchFamily="34" charset="0"/>
-              </a:rPr>
-              <a:t>. </a:t>
-            </a:r>
-            <a:r>
-              <a:rPr lang="pt-BR" sz="3307" b="1" dirty="0">
-                <a:latin typeface="Arial" panose="020B0604020202020204" pitchFamily="34" charset="0"/>
-                <a:cs typeface="Arial" panose="020B0604020202020204" pitchFamily="34" charset="0"/>
-              </a:rPr>
-              <a:t>Em A plumagem não reprodutiva, em B plumagem reprodutiva, Da Cunha </a:t>
-            </a:r>
-            <a:r>
-              <a:rPr lang="pt-BR" sz="3307" b="1" i="1" dirty="0">
-                <a:latin typeface="Arial" panose="020B0604020202020204" pitchFamily="34" charset="0"/>
-                <a:cs typeface="Arial" panose="020B0604020202020204" pitchFamily="34" charset="0"/>
-              </a:rPr>
-              <a:t>et al.</a:t>
-            </a:r>
-          </a:p>
-        </p:txBody>
-      </p:sp>
-      <p:sp>
-        <p:nvSpPr>
-          <p:cNvPr id="16" name="CaixaDeTexto 15">
-            <a:extLst>
-              <a:ext uri="{FF2B5EF4-FFF2-40B4-BE49-F238E27FC236}">
-                <a16:creationId xmlns:a16="http://schemas.microsoft.com/office/drawing/2014/main" id="{B5AAEB80-E0C1-EF4D-4565-25953825823D}"/>
-              </a:ext>
-            </a:extLst>
-          </p:cNvPr>
-          <p:cNvSpPr txBox="1"/>
-          <p:nvPr/>
-        </p:nvSpPr>
-        <p:spPr>
-          <a:xfrm>
-            <a:off x="21479655" y="11882675"/>
-            <a:ext cx="10392148" cy="1110176"/>
-          </a:xfrm>
-          <a:prstGeom prst="rect">
-            <a:avLst/>
-          </a:prstGeom>
-          <a:noFill/>
-        </p:spPr>
-        <p:txBody>
-          <a:bodyPr wrap="square" rtlCol="0">
-            <a:spAutoFit/>
-          </a:bodyPr>
-          <a:lstStyle/>
-          <a:p>
-            <a:pPr algn="l"/>
-            <a:r>
-              <a:rPr lang="pt-BR" sz="3307" b="1" dirty="0" err="1">
-                <a:latin typeface="Arial" panose="020B0604020202020204" pitchFamily="34" charset="0"/>
-                <a:cs typeface="Arial" panose="020B0604020202020204" pitchFamily="34" charset="0"/>
-              </a:rPr>
-              <a:t>Tablela</a:t>
-            </a:r>
-            <a:r>
-              <a:rPr lang="pt-BR" sz="3307" b="1" dirty="0">
-                <a:latin typeface="Arial" panose="020B0604020202020204" pitchFamily="34" charset="0"/>
-                <a:cs typeface="Arial" panose="020B0604020202020204" pitchFamily="34" charset="0"/>
-              </a:rPr>
-              <a:t> 1- Vírus humanos encontrados no genoma de </a:t>
-            </a:r>
-            <a:r>
-              <a:rPr lang="pt-BR" sz="3307" i="1" dirty="0" err="1">
-                <a:latin typeface="Arial" panose="020B0604020202020204" pitchFamily="34" charset="0"/>
-                <a:cs typeface="Arial" panose="020B0604020202020204" pitchFamily="34" charset="0"/>
-              </a:rPr>
-              <a:t>Actitis</a:t>
-            </a:r>
-            <a:r>
-              <a:rPr lang="pt-BR" sz="3307" i="1" dirty="0">
-                <a:latin typeface="Arial" panose="020B0604020202020204" pitchFamily="34" charset="0"/>
-                <a:cs typeface="Arial" panose="020B0604020202020204" pitchFamily="34" charset="0"/>
-              </a:rPr>
-              <a:t>,</a:t>
-            </a:r>
-            <a:r>
-              <a:rPr lang="pt-BR" sz="3307" b="1" dirty="0">
-                <a:latin typeface="Arial" panose="020B0604020202020204" pitchFamily="34" charset="0"/>
-                <a:cs typeface="Arial" panose="020B0604020202020204" pitchFamily="34" charset="0"/>
-              </a:rPr>
-              <a:t> IFPA 2023.</a:t>
-            </a:r>
-          </a:p>
-        </p:txBody>
-      </p:sp>
-      <p:sp>
-        <p:nvSpPr>
-          <p:cNvPr id="17" name="Text Box 21">
-            <a:extLst>
-              <a:ext uri="{FF2B5EF4-FFF2-40B4-BE49-F238E27FC236}">
-                <a16:creationId xmlns:a16="http://schemas.microsoft.com/office/drawing/2014/main" id="{D261B900-0C2B-2518-9B15-108AF7256BC1}"/>
-              </a:ext>
-            </a:extLst>
-          </p:cNvPr>
-          <p:cNvSpPr txBox="1"/>
-          <p:nvPr/>
-        </p:nvSpPr>
-        <p:spPr bwMode="auto">
-          <a:xfrm>
-            <a:off x="13343943" y="14613050"/>
-            <a:ext cx="5999395" cy="1605082"/>
-          </a:xfrm>
-          <a:prstGeom prst="rect">
-            <a:avLst/>
-          </a:prstGeom>
-          <a:noFill/>
-          <a:ln>
-            <a:noFill/>
-          </a:ln>
-          <a:extLst>
-            <a:ext uri="{909E8E84-426E-40DD-AFC4-6F175D3DCCD1}">
-              <a14:hiddenFill xmlns:a14="http://schemas.microsoft.com/office/drawing/2010/main">
-                <a:solidFill>
-                  <a:srgbClr val="FFFFFF"/>
-                </a:solidFill>
-              </a14:hiddenFill>
-            </a:ext>
-            <a:ext uri="{91240B29-F687-4F45-9708-019B960494DF}">
-              <a14:hiddenLine xmlns:a14="http://schemas.microsoft.com/office/drawing/2010/main" w="9525">
-                <a:solidFill>
-                  <a:srgbClr val="000000"/>
-                </a:solidFill>
-                <a:miter lim="800000"/>
-                <a:headEnd/>
-                <a:tailEnd/>
-              </a14:hiddenLine>
-            </a:ext>
-          </a:extLst>
-        </p:spPr>
-        <p:txBody>
-          <a:bodyPr wrap="square" lIns="77560" tIns="38780" rIns="77560" bIns="38780">
-            <a:spAutoFit/>
-          </a:bodyPr>
-          <a:lstStyle>
-            <a:lvl1pPr eaLnBrk="0" hangingPunct="0">
-              <a:defRPr sz="2100">
-                <a:solidFill>
-                  <a:schemeClr val="tx1"/>
-                </a:solidFill>
-                <a:latin typeface="tahoma, verdana, arial" charset="0"/>
-                <a:cs typeface="Times New Roman" panose="02020603050405020304" pitchFamily="18" charset="0"/>
-              </a:defRPr>
-            </a:lvl1pPr>
-            <a:lvl2pPr marL="742950" indent="-285750" eaLnBrk="0" hangingPunct="0">
-              <a:defRPr sz="2100">
-                <a:solidFill>
-                  <a:schemeClr val="tx1"/>
-                </a:solidFill>
-                <a:latin typeface="tahoma, verdana, arial" charset="0"/>
-                <a:cs typeface="Times New Roman" panose="02020603050405020304" pitchFamily="18" charset="0"/>
-              </a:defRPr>
-            </a:lvl2pPr>
-            <a:lvl3pPr marL="1143000" indent="-228600" eaLnBrk="0" hangingPunct="0">
-              <a:defRPr sz="2100">
-                <a:solidFill>
-                  <a:schemeClr val="tx1"/>
-                </a:solidFill>
-                <a:latin typeface="tahoma, verdana, arial" charset="0"/>
-                <a:cs typeface="Times New Roman" panose="02020603050405020304" pitchFamily="18" charset="0"/>
-              </a:defRPr>
-            </a:lvl3pPr>
-            <a:lvl4pPr marL="1600200" indent="-228600" eaLnBrk="0" hangingPunct="0">
-              <a:defRPr sz="2100">
-                <a:solidFill>
-                  <a:schemeClr val="tx1"/>
-                </a:solidFill>
-                <a:latin typeface="tahoma, verdana, arial" charset="0"/>
-                <a:cs typeface="Times New Roman" panose="02020603050405020304" pitchFamily="18" charset="0"/>
-              </a:defRPr>
-            </a:lvl4pPr>
-            <a:lvl5pPr marL="2057400" indent="-228600" eaLnBrk="0" hangingPunct="0">
-              <a:defRPr sz="2100">
-                <a:solidFill>
-                  <a:schemeClr val="tx1"/>
-                </a:solidFill>
-                <a:latin typeface="tahoma, verdana, arial" charset="0"/>
-                <a:cs typeface="Times New Roman" panose="02020603050405020304" pitchFamily="18" charset="0"/>
-              </a:defRPr>
-            </a:lvl5pPr>
-            <a:lvl6pPr marL="2514600" indent="-228600" algn="ctr" eaLnBrk="0" fontAlgn="base" hangingPunct="0">
-              <a:spcBef>
-                <a:spcPct val="0"/>
-              </a:spcBef>
-              <a:spcAft>
-                <a:spcPct val="0"/>
-              </a:spcAft>
-              <a:defRPr sz="2100">
-                <a:solidFill>
-                  <a:schemeClr val="tx1"/>
-                </a:solidFill>
-                <a:latin typeface="tahoma, verdana, arial" charset="0"/>
-                <a:cs typeface="Times New Roman" panose="02020603050405020304" pitchFamily="18" charset="0"/>
-              </a:defRPr>
-            </a:lvl6pPr>
-            <a:lvl7pPr marL="2971800" indent="-228600" algn="ctr" eaLnBrk="0" fontAlgn="base" hangingPunct="0">
-              <a:spcBef>
-                <a:spcPct val="0"/>
-              </a:spcBef>
-              <a:spcAft>
-                <a:spcPct val="0"/>
-              </a:spcAft>
-              <a:defRPr sz="2100">
-                <a:solidFill>
-                  <a:schemeClr val="tx1"/>
-                </a:solidFill>
-                <a:latin typeface="tahoma, verdana, arial" charset="0"/>
-                <a:cs typeface="Times New Roman" panose="02020603050405020304" pitchFamily="18" charset="0"/>
-              </a:defRPr>
-            </a:lvl7pPr>
-            <a:lvl8pPr marL="3429000" indent="-228600" algn="ctr" eaLnBrk="0" fontAlgn="base" hangingPunct="0">
-              <a:spcBef>
-                <a:spcPct val="0"/>
-              </a:spcBef>
-              <a:spcAft>
-                <a:spcPct val="0"/>
-              </a:spcAft>
-              <a:defRPr sz="2100">
-                <a:solidFill>
-                  <a:schemeClr val="tx1"/>
-                </a:solidFill>
-                <a:latin typeface="tahoma, verdana, arial" charset="0"/>
-                <a:cs typeface="Times New Roman" panose="02020603050405020304" pitchFamily="18" charset="0"/>
-              </a:defRPr>
-            </a:lvl8pPr>
-            <a:lvl9pPr marL="3886200" indent="-228600" algn="ctr" eaLnBrk="0" fontAlgn="base" hangingPunct="0">
-              <a:spcBef>
-                <a:spcPct val="0"/>
-              </a:spcBef>
-              <a:spcAft>
-                <a:spcPct val="0"/>
-              </a:spcAft>
-              <a:defRPr sz="2100">
-                <a:solidFill>
-                  <a:schemeClr val="tx1"/>
-                </a:solidFill>
-                <a:latin typeface="tahoma, verdana, arial" charset="0"/>
-                <a:cs typeface="Times New Roman" panose="02020603050405020304" pitchFamily="18" charset="0"/>
-              </a:defRPr>
-            </a:lvl9pPr>
-          </a:lstStyle>
-          <a:p>
-            <a:pPr algn="just" eaLnBrk="1" hangingPunct="1"/>
-            <a:r>
-              <a:rPr lang="pt-BR" altLang="pt-BR" sz="3307" dirty="0">
-                <a:latin typeface="Arial" panose="020B0604020202020204" pitchFamily="34" charset="0"/>
-                <a:cs typeface="Arial" panose="020B0604020202020204" pitchFamily="34" charset="0"/>
-              </a:rPr>
-              <a:t>Coleta feita com rede de neblina, perfusão com </a:t>
-            </a:r>
-            <a:r>
-              <a:rPr lang="pt-BR" altLang="pt-BR" sz="3307" dirty="0" err="1">
-                <a:latin typeface="Arial" panose="020B0604020202020204" pitchFamily="34" charset="0"/>
-                <a:cs typeface="Arial" panose="020B0604020202020204" pitchFamily="34" charset="0"/>
-              </a:rPr>
-              <a:t>paraformol</a:t>
-            </a:r>
-            <a:r>
-              <a:rPr lang="pt-BR" altLang="pt-BR" sz="3307" dirty="0">
-                <a:latin typeface="Arial" panose="020B0604020202020204" pitchFamily="34" charset="0"/>
-                <a:cs typeface="Arial" panose="020B0604020202020204" pitchFamily="34" charset="0"/>
-              </a:rPr>
-              <a:t> e RNA Later.</a:t>
-            </a:r>
-          </a:p>
-        </p:txBody>
-      </p:sp>
-      <p:sp>
-        <p:nvSpPr>
-          <p:cNvPr id="24" name="Text Box 21">
-            <a:extLst>
-              <a:ext uri="{FF2B5EF4-FFF2-40B4-BE49-F238E27FC236}">
-                <a16:creationId xmlns:a16="http://schemas.microsoft.com/office/drawing/2014/main" id="{3493AD82-089C-F3CC-B838-602BBB8C1574}"/>
-              </a:ext>
-            </a:extLst>
-          </p:cNvPr>
-          <p:cNvSpPr txBox="1"/>
-          <p:nvPr/>
-        </p:nvSpPr>
-        <p:spPr bwMode="auto">
-          <a:xfrm>
-            <a:off x="13487369" y="17312634"/>
-            <a:ext cx="5999395" cy="1605082"/>
-          </a:xfrm>
-          <a:prstGeom prst="rect">
-            <a:avLst/>
-          </a:prstGeom>
-          <a:noFill/>
-          <a:ln>
-            <a:noFill/>
-          </a:ln>
-          <a:extLst>
-            <a:ext uri="{909E8E84-426E-40DD-AFC4-6F175D3DCCD1}">
-              <a14:hiddenFill xmlns:a14="http://schemas.microsoft.com/office/drawing/2010/main">
-                <a:solidFill>
-                  <a:srgbClr val="FFFFFF"/>
-                </a:solidFill>
-              </a14:hiddenFill>
-            </a:ext>
-            <a:ext uri="{91240B29-F687-4F45-9708-019B960494DF}">
-              <a14:hiddenLine xmlns:a14="http://schemas.microsoft.com/office/drawing/2010/main" w="9525">
-                <a:solidFill>
-                  <a:srgbClr val="000000"/>
-                </a:solidFill>
-                <a:miter lim="800000"/>
-                <a:headEnd/>
-                <a:tailEnd/>
-              </a14:hiddenLine>
-            </a:ext>
-          </a:extLst>
-        </p:spPr>
-        <p:txBody>
-          <a:bodyPr wrap="square" lIns="77560" tIns="38780" rIns="77560" bIns="38780">
-            <a:spAutoFit/>
-          </a:bodyPr>
-          <a:lstStyle>
-            <a:lvl1pPr eaLnBrk="0" hangingPunct="0">
-              <a:defRPr sz="2100">
-                <a:solidFill>
-                  <a:schemeClr val="tx1"/>
-                </a:solidFill>
-                <a:latin typeface="tahoma, verdana, arial" charset="0"/>
-                <a:cs typeface="Times New Roman" panose="02020603050405020304" pitchFamily="18" charset="0"/>
-              </a:defRPr>
-            </a:lvl1pPr>
-            <a:lvl2pPr marL="742950" indent="-285750" eaLnBrk="0" hangingPunct="0">
-              <a:defRPr sz="2100">
-                <a:solidFill>
-                  <a:schemeClr val="tx1"/>
-                </a:solidFill>
-                <a:latin typeface="tahoma, verdana, arial" charset="0"/>
-                <a:cs typeface="Times New Roman" panose="02020603050405020304" pitchFamily="18" charset="0"/>
-              </a:defRPr>
-            </a:lvl2pPr>
-            <a:lvl3pPr marL="1143000" indent="-228600" eaLnBrk="0" hangingPunct="0">
-              <a:defRPr sz="2100">
-                <a:solidFill>
-                  <a:schemeClr val="tx1"/>
-                </a:solidFill>
-                <a:latin typeface="tahoma, verdana, arial" charset="0"/>
-                <a:cs typeface="Times New Roman" panose="02020603050405020304" pitchFamily="18" charset="0"/>
-              </a:defRPr>
-            </a:lvl3pPr>
-            <a:lvl4pPr marL="1600200" indent="-228600" eaLnBrk="0" hangingPunct="0">
-              <a:defRPr sz="2100">
-                <a:solidFill>
-                  <a:schemeClr val="tx1"/>
-                </a:solidFill>
-                <a:latin typeface="tahoma, verdana, arial" charset="0"/>
-                <a:cs typeface="Times New Roman" panose="02020603050405020304" pitchFamily="18" charset="0"/>
-              </a:defRPr>
-            </a:lvl4pPr>
-            <a:lvl5pPr marL="2057400" indent="-228600" eaLnBrk="0" hangingPunct="0">
-              <a:defRPr sz="2100">
-                <a:solidFill>
-                  <a:schemeClr val="tx1"/>
-                </a:solidFill>
-                <a:latin typeface="tahoma, verdana, arial" charset="0"/>
-                <a:cs typeface="Times New Roman" panose="02020603050405020304" pitchFamily="18" charset="0"/>
-              </a:defRPr>
-            </a:lvl5pPr>
-            <a:lvl6pPr marL="2514600" indent="-228600" algn="ctr" eaLnBrk="0" fontAlgn="base" hangingPunct="0">
-              <a:spcBef>
-                <a:spcPct val="0"/>
-              </a:spcBef>
-              <a:spcAft>
-                <a:spcPct val="0"/>
-              </a:spcAft>
-              <a:defRPr sz="2100">
-                <a:solidFill>
-                  <a:schemeClr val="tx1"/>
-                </a:solidFill>
-                <a:latin typeface="tahoma, verdana, arial" charset="0"/>
-                <a:cs typeface="Times New Roman" panose="02020603050405020304" pitchFamily="18" charset="0"/>
-              </a:defRPr>
-            </a:lvl6pPr>
-            <a:lvl7pPr marL="2971800" indent="-228600" algn="ctr" eaLnBrk="0" fontAlgn="base" hangingPunct="0">
-              <a:spcBef>
-                <a:spcPct val="0"/>
-              </a:spcBef>
-              <a:spcAft>
-                <a:spcPct val="0"/>
-              </a:spcAft>
-              <a:defRPr sz="2100">
-                <a:solidFill>
-                  <a:schemeClr val="tx1"/>
-                </a:solidFill>
-                <a:latin typeface="tahoma, verdana, arial" charset="0"/>
-                <a:cs typeface="Times New Roman" panose="02020603050405020304" pitchFamily="18" charset="0"/>
-              </a:defRPr>
-            </a:lvl7pPr>
-            <a:lvl8pPr marL="3429000" indent="-228600" algn="ctr" eaLnBrk="0" fontAlgn="base" hangingPunct="0">
-              <a:spcBef>
-                <a:spcPct val="0"/>
-              </a:spcBef>
-              <a:spcAft>
-                <a:spcPct val="0"/>
-              </a:spcAft>
-              <a:defRPr sz="2100">
-                <a:solidFill>
-                  <a:schemeClr val="tx1"/>
-                </a:solidFill>
-                <a:latin typeface="tahoma, verdana, arial" charset="0"/>
-                <a:cs typeface="Times New Roman" panose="02020603050405020304" pitchFamily="18" charset="0"/>
-              </a:defRPr>
-            </a:lvl8pPr>
-            <a:lvl9pPr marL="3886200" indent="-228600" algn="ctr" eaLnBrk="0" fontAlgn="base" hangingPunct="0">
-              <a:spcBef>
-                <a:spcPct val="0"/>
-              </a:spcBef>
-              <a:spcAft>
-                <a:spcPct val="0"/>
-              </a:spcAft>
-              <a:defRPr sz="2100">
-                <a:solidFill>
-                  <a:schemeClr val="tx1"/>
-                </a:solidFill>
-                <a:latin typeface="tahoma, verdana, arial" charset="0"/>
-                <a:cs typeface="Times New Roman" panose="02020603050405020304" pitchFamily="18" charset="0"/>
-              </a:defRPr>
-            </a:lvl9pPr>
-          </a:lstStyle>
-          <a:p>
-            <a:pPr algn="just" eaLnBrk="1" hangingPunct="1"/>
-            <a:r>
-              <a:rPr lang="pt-BR" altLang="pt-BR" sz="3307" dirty="0">
-                <a:latin typeface="Arial" panose="020B0604020202020204" pitchFamily="34" charset="0"/>
-                <a:cs typeface="Arial" panose="020B0604020202020204" pitchFamily="34" charset="0"/>
-              </a:rPr>
-              <a:t>Feita com cuidado para não danificar o tecido e separar o telencéfalo.</a:t>
-            </a:r>
-          </a:p>
-        </p:txBody>
-      </p:sp>
-      <p:sp>
-        <p:nvSpPr>
-          <p:cNvPr id="25" name="Text Box 21">
-            <a:extLst>
-              <a:ext uri="{FF2B5EF4-FFF2-40B4-BE49-F238E27FC236}">
-                <a16:creationId xmlns:a16="http://schemas.microsoft.com/office/drawing/2014/main" id="{21F21434-DF94-7337-683E-14FAE525399A}"/>
-              </a:ext>
-            </a:extLst>
-          </p:cNvPr>
-          <p:cNvSpPr txBox="1"/>
-          <p:nvPr/>
-        </p:nvSpPr>
-        <p:spPr bwMode="auto">
-          <a:xfrm>
-            <a:off x="13487369" y="20039495"/>
-            <a:ext cx="5999395" cy="1605082"/>
-          </a:xfrm>
-          <a:prstGeom prst="rect">
-            <a:avLst/>
-          </a:prstGeom>
-          <a:noFill/>
-          <a:ln>
-            <a:noFill/>
-          </a:ln>
-          <a:extLst>
-            <a:ext uri="{909E8E84-426E-40DD-AFC4-6F175D3DCCD1}">
-              <a14:hiddenFill xmlns:a14="http://schemas.microsoft.com/office/drawing/2010/main">
-                <a:solidFill>
-                  <a:srgbClr val="FFFFFF"/>
-                </a:solidFill>
-              </a14:hiddenFill>
-            </a:ext>
-            <a:ext uri="{91240B29-F687-4F45-9708-019B960494DF}">
-              <a14:hiddenLine xmlns:a14="http://schemas.microsoft.com/office/drawing/2010/main" w="9525">
-                <a:solidFill>
-                  <a:srgbClr val="000000"/>
-                </a:solidFill>
-                <a:miter lim="800000"/>
-                <a:headEnd/>
-                <a:tailEnd/>
-              </a14:hiddenLine>
-            </a:ext>
-          </a:extLst>
-        </p:spPr>
-        <p:txBody>
-          <a:bodyPr wrap="square" lIns="77560" tIns="38780" rIns="77560" bIns="38780">
-            <a:spAutoFit/>
-          </a:bodyPr>
-          <a:lstStyle>
-            <a:lvl1pPr eaLnBrk="0" hangingPunct="0">
-              <a:defRPr sz="2100">
-                <a:solidFill>
-                  <a:schemeClr val="tx1"/>
-                </a:solidFill>
-                <a:latin typeface="tahoma, verdana, arial" charset="0"/>
-                <a:cs typeface="Times New Roman" panose="02020603050405020304" pitchFamily="18" charset="0"/>
-              </a:defRPr>
-            </a:lvl1pPr>
-            <a:lvl2pPr marL="742950" indent="-285750" eaLnBrk="0" hangingPunct="0">
-              <a:defRPr sz="2100">
-                <a:solidFill>
-                  <a:schemeClr val="tx1"/>
-                </a:solidFill>
-                <a:latin typeface="tahoma, verdana, arial" charset="0"/>
-                <a:cs typeface="Times New Roman" panose="02020603050405020304" pitchFamily="18" charset="0"/>
-              </a:defRPr>
-            </a:lvl2pPr>
-            <a:lvl3pPr marL="1143000" indent="-228600" eaLnBrk="0" hangingPunct="0">
-              <a:defRPr sz="2100">
-                <a:solidFill>
-                  <a:schemeClr val="tx1"/>
-                </a:solidFill>
-                <a:latin typeface="tahoma, verdana, arial" charset="0"/>
-                <a:cs typeface="Times New Roman" panose="02020603050405020304" pitchFamily="18" charset="0"/>
-              </a:defRPr>
-            </a:lvl3pPr>
-            <a:lvl4pPr marL="1600200" indent="-228600" eaLnBrk="0" hangingPunct="0">
-              <a:defRPr sz="2100">
-                <a:solidFill>
-                  <a:schemeClr val="tx1"/>
-                </a:solidFill>
-                <a:latin typeface="tahoma, verdana, arial" charset="0"/>
-                <a:cs typeface="Times New Roman" panose="02020603050405020304" pitchFamily="18" charset="0"/>
-              </a:defRPr>
-            </a:lvl4pPr>
-            <a:lvl5pPr marL="2057400" indent="-228600" eaLnBrk="0" hangingPunct="0">
-              <a:defRPr sz="2100">
-                <a:solidFill>
-                  <a:schemeClr val="tx1"/>
-                </a:solidFill>
-                <a:latin typeface="tahoma, verdana, arial" charset="0"/>
-                <a:cs typeface="Times New Roman" panose="02020603050405020304" pitchFamily="18" charset="0"/>
-              </a:defRPr>
-            </a:lvl5pPr>
-            <a:lvl6pPr marL="2514600" indent="-228600" algn="ctr" eaLnBrk="0" fontAlgn="base" hangingPunct="0">
-              <a:spcBef>
-                <a:spcPct val="0"/>
-              </a:spcBef>
-              <a:spcAft>
-                <a:spcPct val="0"/>
-              </a:spcAft>
-              <a:defRPr sz="2100">
-                <a:solidFill>
-                  <a:schemeClr val="tx1"/>
-                </a:solidFill>
-                <a:latin typeface="tahoma, verdana, arial" charset="0"/>
-                <a:cs typeface="Times New Roman" panose="02020603050405020304" pitchFamily="18" charset="0"/>
-              </a:defRPr>
-            </a:lvl6pPr>
-            <a:lvl7pPr marL="2971800" indent="-228600" algn="ctr" eaLnBrk="0" fontAlgn="base" hangingPunct="0">
-              <a:spcBef>
-                <a:spcPct val="0"/>
-              </a:spcBef>
-              <a:spcAft>
-                <a:spcPct val="0"/>
-              </a:spcAft>
-              <a:defRPr sz="2100">
-                <a:solidFill>
-                  <a:schemeClr val="tx1"/>
-                </a:solidFill>
-                <a:latin typeface="tahoma, verdana, arial" charset="0"/>
-                <a:cs typeface="Times New Roman" panose="02020603050405020304" pitchFamily="18" charset="0"/>
-              </a:defRPr>
-            </a:lvl7pPr>
-            <a:lvl8pPr marL="3429000" indent="-228600" algn="ctr" eaLnBrk="0" fontAlgn="base" hangingPunct="0">
-              <a:spcBef>
-                <a:spcPct val="0"/>
-              </a:spcBef>
-              <a:spcAft>
-                <a:spcPct val="0"/>
-              </a:spcAft>
-              <a:defRPr sz="2100">
-                <a:solidFill>
-                  <a:schemeClr val="tx1"/>
-                </a:solidFill>
-                <a:latin typeface="tahoma, verdana, arial" charset="0"/>
-                <a:cs typeface="Times New Roman" panose="02020603050405020304" pitchFamily="18" charset="0"/>
-              </a:defRPr>
-            </a:lvl8pPr>
-            <a:lvl9pPr marL="3886200" indent="-228600" algn="ctr" eaLnBrk="0" fontAlgn="base" hangingPunct="0">
-              <a:spcBef>
-                <a:spcPct val="0"/>
-              </a:spcBef>
-              <a:spcAft>
-                <a:spcPct val="0"/>
-              </a:spcAft>
-              <a:defRPr sz="2100">
-                <a:solidFill>
-                  <a:schemeClr val="tx1"/>
-                </a:solidFill>
-                <a:latin typeface="tahoma, verdana, arial" charset="0"/>
-                <a:cs typeface="Times New Roman" panose="02020603050405020304" pitchFamily="18" charset="0"/>
-              </a:defRPr>
-            </a:lvl9pPr>
-          </a:lstStyle>
-          <a:p>
-            <a:pPr algn="just" eaLnBrk="1" hangingPunct="1"/>
-            <a:r>
-              <a:rPr lang="pt-BR" altLang="pt-BR" sz="3307" dirty="0">
-                <a:latin typeface="Arial" panose="020B0604020202020204" pitchFamily="34" charset="0"/>
-                <a:cs typeface="Arial" panose="020B0604020202020204" pitchFamily="34" charset="0"/>
-              </a:rPr>
-              <a:t>Protocolo de </a:t>
-            </a:r>
-            <a:r>
-              <a:rPr lang="pt-BR" altLang="pt-BR" sz="3307" dirty="0" err="1">
-                <a:latin typeface="Arial" panose="020B0604020202020204" pitchFamily="34" charset="0"/>
-                <a:cs typeface="Arial" panose="020B0604020202020204" pitchFamily="34" charset="0"/>
-              </a:rPr>
-              <a:t>TRIzolTM</a:t>
-            </a:r>
-            <a:r>
-              <a:rPr lang="pt-BR" altLang="pt-BR" sz="3307" dirty="0">
-                <a:latin typeface="Arial" panose="020B0604020202020204" pitchFamily="34" charset="0"/>
-                <a:cs typeface="Arial" panose="020B0604020202020204" pitchFamily="34" charset="0"/>
-              </a:rPr>
-              <a:t>. Purificação do mRNA e posterior conversão em </a:t>
-            </a:r>
-            <a:r>
-              <a:rPr lang="pt-BR" altLang="pt-BR" sz="3307" dirty="0" err="1">
-                <a:latin typeface="Arial" panose="020B0604020202020204" pitchFamily="34" charset="0"/>
-                <a:cs typeface="Arial" panose="020B0604020202020204" pitchFamily="34" charset="0"/>
-              </a:rPr>
-              <a:t>cDNA</a:t>
-            </a:r>
-            <a:r>
-              <a:rPr lang="pt-BR" altLang="pt-BR" sz="3307" dirty="0">
-                <a:latin typeface="Arial" panose="020B0604020202020204" pitchFamily="34" charset="0"/>
-                <a:cs typeface="Arial" panose="020B0604020202020204" pitchFamily="34" charset="0"/>
-              </a:rPr>
-              <a:t>.</a:t>
-            </a:r>
-          </a:p>
-        </p:txBody>
-      </p:sp>
-      <p:sp>
-        <p:nvSpPr>
-          <p:cNvPr id="26" name="Text Box 21">
-            <a:extLst>
-              <a:ext uri="{FF2B5EF4-FFF2-40B4-BE49-F238E27FC236}">
-                <a16:creationId xmlns:a16="http://schemas.microsoft.com/office/drawing/2014/main" id="{6900221A-208F-934E-4FC2-89F89D917E89}"/>
-              </a:ext>
-            </a:extLst>
-          </p:cNvPr>
-          <p:cNvSpPr txBox="1"/>
-          <p:nvPr/>
-        </p:nvSpPr>
-        <p:spPr bwMode="auto">
-          <a:xfrm>
-            <a:off x="13484815" y="22766357"/>
-            <a:ext cx="5999395" cy="1605082"/>
-          </a:xfrm>
-          <a:prstGeom prst="rect">
-            <a:avLst/>
-          </a:prstGeom>
-          <a:noFill/>
-          <a:ln>
-            <a:noFill/>
-          </a:ln>
-          <a:extLst>
-            <a:ext uri="{909E8E84-426E-40DD-AFC4-6F175D3DCCD1}">
-              <a14:hiddenFill xmlns:a14="http://schemas.microsoft.com/office/drawing/2010/main">
-                <a:solidFill>
-                  <a:srgbClr val="FFFFFF"/>
-                </a:solidFill>
-              </a14:hiddenFill>
-            </a:ext>
-            <a:ext uri="{91240B29-F687-4F45-9708-019B960494DF}">
-              <a14:hiddenLine xmlns:a14="http://schemas.microsoft.com/office/drawing/2010/main" w="9525">
-                <a:solidFill>
-                  <a:srgbClr val="000000"/>
-                </a:solidFill>
-                <a:miter lim="800000"/>
-                <a:headEnd/>
-                <a:tailEnd/>
-              </a14:hiddenLine>
-            </a:ext>
-          </a:extLst>
-        </p:spPr>
-        <p:txBody>
-          <a:bodyPr wrap="square" lIns="77560" tIns="38780" rIns="77560" bIns="38780">
-            <a:spAutoFit/>
-          </a:bodyPr>
-          <a:lstStyle>
-            <a:lvl1pPr eaLnBrk="0" hangingPunct="0">
-              <a:defRPr sz="2100">
-                <a:solidFill>
-                  <a:schemeClr val="tx1"/>
-                </a:solidFill>
-                <a:latin typeface="tahoma, verdana, arial" charset="0"/>
-                <a:cs typeface="Times New Roman" panose="02020603050405020304" pitchFamily="18" charset="0"/>
-              </a:defRPr>
-            </a:lvl1pPr>
-            <a:lvl2pPr marL="742950" indent="-285750" eaLnBrk="0" hangingPunct="0">
-              <a:defRPr sz="2100">
-                <a:solidFill>
-                  <a:schemeClr val="tx1"/>
-                </a:solidFill>
-                <a:latin typeface="tahoma, verdana, arial" charset="0"/>
-                <a:cs typeface="Times New Roman" panose="02020603050405020304" pitchFamily="18" charset="0"/>
-              </a:defRPr>
-            </a:lvl2pPr>
-            <a:lvl3pPr marL="1143000" indent="-228600" eaLnBrk="0" hangingPunct="0">
-              <a:defRPr sz="2100">
-                <a:solidFill>
-                  <a:schemeClr val="tx1"/>
-                </a:solidFill>
-                <a:latin typeface="tahoma, verdana, arial" charset="0"/>
-                <a:cs typeface="Times New Roman" panose="02020603050405020304" pitchFamily="18" charset="0"/>
-              </a:defRPr>
-            </a:lvl3pPr>
-            <a:lvl4pPr marL="1600200" indent="-228600" eaLnBrk="0" hangingPunct="0">
-              <a:defRPr sz="2100">
-                <a:solidFill>
-                  <a:schemeClr val="tx1"/>
-                </a:solidFill>
-                <a:latin typeface="tahoma, verdana, arial" charset="0"/>
-                <a:cs typeface="Times New Roman" panose="02020603050405020304" pitchFamily="18" charset="0"/>
-              </a:defRPr>
-            </a:lvl4pPr>
-            <a:lvl5pPr marL="2057400" indent="-228600" eaLnBrk="0" hangingPunct="0">
-              <a:defRPr sz="2100">
-                <a:solidFill>
-                  <a:schemeClr val="tx1"/>
-                </a:solidFill>
-                <a:latin typeface="tahoma, verdana, arial" charset="0"/>
-                <a:cs typeface="Times New Roman" panose="02020603050405020304" pitchFamily="18" charset="0"/>
-              </a:defRPr>
-            </a:lvl5pPr>
-            <a:lvl6pPr marL="2514600" indent="-228600" algn="ctr" eaLnBrk="0" fontAlgn="base" hangingPunct="0">
-              <a:spcBef>
-                <a:spcPct val="0"/>
-              </a:spcBef>
-              <a:spcAft>
-                <a:spcPct val="0"/>
-              </a:spcAft>
-              <a:defRPr sz="2100">
-                <a:solidFill>
-                  <a:schemeClr val="tx1"/>
-                </a:solidFill>
-                <a:latin typeface="tahoma, verdana, arial" charset="0"/>
-                <a:cs typeface="Times New Roman" panose="02020603050405020304" pitchFamily="18" charset="0"/>
-              </a:defRPr>
-            </a:lvl6pPr>
-            <a:lvl7pPr marL="2971800" indent="-228600" algn="ctr" eaLnBrk="0" fontAlgn="base" hangingPunct="0">
-              <a:spcBef>
-                <a:spcPct val="0"/>
-              </a:spcBef>
-              <a:spcAft>
-                <a:spcPct val="0"/>
-              </a:spcAft>
-              <a:defRPr sz="2100">
-                <a:solidFill>
-                  <a:schemeClr val="tx1"/>
-                </a:solidFill>
-                <a:latin typeface="tahoma, verdana, arial" charset="0"/>
-                <a:cs typeface="Times New Roman" panose="02020603050405020304" pitchFamily="18" charset="0"/>
-              </a:defRPr>
-            </a:lvl7pPr>
-            <a:lvl8pPr marL="3429000" indent="-228600" algn="ctr" eaLnBrk="0" fontAlgn="base" hangingPunct="0">
-              <a:spcBef>
-                <a:spcPct val="0"/>
-              </a:spcBef>
-              <a:spcAft>
-                <a:spcPct val="0"/>
-              </a:spcAft>
-              <a:defRPr sz="2100">
-                <a:solidFill>
-                  <a:schemeClr val="tx1"/>
-                </a:solidFill>
-                <a:latin typeface="tahoma, verdana, arial" charset="0"/>
-                <a:cs typeface="Times New Roman" panose="02020603050405020304" pitchFamily="18" charset="0"/>
-              </a:defRPr>
-            </a:lvl8pPr>
-            <a:lvl9pPr marL="3886200" indent="-228600" algn="ctr" eaLnBrk="0" fontAlgn="base" hangingPunct="0">
-              <a:spcBef>
-                <a:spcPct val="0"/>
-              </a:spcBef>
-              <a:spcAft>
-                <a:spcPct val="0"/>
-              </a:spcAft>
-              <a:defRPr sz="2100">
-                <a:solidFill>
-                  <a:schemeClr val="tx1"/>
-                </a:solidFill>
-                <a:latin typeface="tahoma, verdana, arial" charset="0"/>
-                <a:cs typeface="Times New Roman" panose="02020603050405020304" pitchFamily="18" charset="0"/>
-              </a:defRPr>
-            </a:lvl9pPr>
-          </a:lstStyle>
-          <a:p>
-            <a:pPr algn="just" eaLnBrk="1" hangingPunct="1"/>
-            <a:r>
-              <a:rPr lang="pt-BR" altLang="pt-BR" sz="3307" dirty="0">
-                <a:latin typeface="Arial" panose="020B0604020202020204" pitchFamily="34" charset="0"/>
-                <a:cs typeface="Arial" panose="020B0604020202020204" pitchFamily="34" charset="0"/>
-              </a:rPr>
-              <a:t>Ion Chef, Ion 540TM Chip e Ion S5 </a:t>
-            </a:r>
-            <a:r>
-              <a:rPr lang="pt-BR" altLang="pt-BR" sz="3307" dirty="0" err="1">
-                <a:latin typeface="Arial" panose="020B0604020202020204" pitchFamily="34" charset="0"/>
-                <a:cs typeface="Arial" panose="020B0604020202020204" pitchFamily="34" charset="0"/>
-              </a:rPr>
-              <a:t>GeneStudio</a:t>
-            </a:r>
-            <a:r>
-              <a:rPr lang="pt-BR" altLang="pt-BR" sz="3307" dirty="0">
-                <a:latin typeface="Arial" panose="020B0604020202020204" pitchFamily="34" charset="0"/>
-                <a:cs typeface="Arial" panose="020B0604020202020204" pitchFamily="34" charset="0"/>
-              </a:rPr>
-              <a:t> System.</a:t>
-            </a:r>
-          </a:p>
-          <a:p>
-            <a:pPr algn="just" eaLnBrk="1" hangingPunct="1"/>
-            <a:r>
-              <a:rPr lang="pt-BR" altLang="pt-BR" sz="3307" dirty="0">
-                <a:latin typeface="Arial" panose="020B0604020202020204" pitchFamily="34" charset="0"/>
-                <a:cs typeface="Arial" panose="020B0604020202020204" pitchFamily="34" charset="0"/>
-              </a:rPr>
-              <a:t>Arquivos FASTQ.</a:t>
-            </a:r>
-          </a:p>
-        </p:txBody>
-      </p:sp>
-      <p:sp>
-        <p:nvSpPr>
-          <p:cNvPr id="27" name="Text Box 21">
-            <a:extLst>
-              <a:ext uri="{FF2B5EF4-FFF2-40B4-BE49-F238E27FC236}">
-                <a16:creationId xmlns:a16="http://schemas.microsoft.com/office/drawing/2014/main" id="{D92E1F51-1C7A-AD3E-7FC6-B12725808C10}"/>
-              </a:ext>
-            </a:extLst>
-          </p:cNvPr>
-          <p:cNvSpPr txBox="1"/>
-          <p:nvPr/>
-        </p:nvSpPr>
-        <p:spPr bwMode="auto">
-          <a:xfrm>
-            <a:off x="13484814" y="25359008"/>
-            <a:ext cx="5801800" cy="2114003"/>
-          </a:xfrm>
-          <a:prstGeom prst="rect">
-            <a:avLst/>
-          </a:prstGeom>
-          <a:noFill/>
-          <a:ln>
-            <a:noFill/>
-          </a:ln>
-          <a:extLst>
-            <a:ext uri="{909E8E84-426E-40DD-AFC4-6F175D3DCCD1}">
-              <a14:hiddenFill xmlns:a14="http://schemas.microsoft.com/office/drawing/2010/main">
-                <a:solidFill>
-                  <a:srgbClr val="FFFFFF"/>
-                </a:solidFill>
-              </a14:hiddenFill>
-            </a:ext>
-            <a:ext uri="{91240B29-F687-4F45-9708-019B960494DF}">
-              <a14:hiddenLine xmlns:a14="http://schemas.microsoft.com/office/drawing/2010/main" w="9525">
-                <a:solidFill>
-                  <a:srgbClr val="000000"/>
-                </a:solidFill>
-                <a:miter lim="800000"/>
-                <a:headEnd/>
-                <a:tailEnd/>
-              </a14:hiddenLine>
-            </a:ext>
-          </a:extLst>
-        </p:spPr>
-        <p:txBody>
-          <a:bodyPr wrap="square" lIns="77560" tIns="38780" rIns="77560" bIns="38780">
-            <a:spAutoFit/>
-          </a:bodyPr>
-          <a:lstStyle>
-            <a:lvl1pPr eaLnBrk="0" hangingPunct="0">
-              <a:defRPr sz="2100">
-                <a:solidFill>
-                  <a:schemeClr val="tx1"/>
-                </a:solidFill>
-                <a:latin typeface="tahoma, verdana, arial" charset="0"/>
-                <a:cs typeface="Times New Roman" panose="02020603050405020304" pitchFamily="18" charset="0"/>
-              </a:defRPr>
-            </a:lvl1pPr>
-            <a:lvl2pPr marL="742950" indent="-285750" eaLnBrk="0" hangingPunct="0">
-              <a:defRPr sz="2100">
-                <a:solidFill>
-                  <a:schemeClr val="tx1"/>
-                </a:solidFill>
-                <a:latin typeface="tahoma, verdana, arial" charset="0"/>
-                <a:cs typeface="Times New Roman" panose="02020603050405020304" pitchFamily="18" charset="0"/>
-              </a:defRPr>
-            </a:lvl2pPr>
-            <a:lvl3pPr marL="1143000" indent="-228600" eaLnBrk="0" hangingPunct="0">
-              <a:defRPr sz="2100">
-                <a:solidFill>
-                  <a:schemeClr val="tx1"/>
-                </a:solidFill>
-                <a:latin typeface="tahoma, verdana, arial" charset="0"/>
-                <a:cs typeface="Times New Roman" panose="02020603050405020304" pitchFamily="18" charset="0"/>
-              </a:defRPr>
-            </a:lvl3pPr>
-            <a:lvl4pPr marL="1600200" indent="-228600" eaLnBrk="0" hangingPunct="0">
-              <a:defRPr sz="2100">
-                <a:solidFill>
-                  <a:schemeClr val="tx1"/>
-                </a:solidFill>
-                <a:latin typeface="tahoma, verdana, arial" charset="0"/>
-                <a:cs typeface="Times New Roman" panose="02020603050405020304" pitchFamily="18" charset="0"/>
-              </a:defRPr>
-            </a:lvl4pPr>
-            <a:lvl5pPr marL="2057400" indent="-228600" eaLnBrk="0" hangingPunct="0">
-              <a:defRPr sz="2100">
-                <a:solidFill>
-                  <a:schemeClr val="tx1"/>
-                </a:solidFill>
-                <a:latin typeface="tahoma, verdana, arial" charset="0"/>
-                <a:cs typeface="Times New Roman" panose="02020603050405020304" pitchFamily="18" charset="0"/>
-              </a:defRPr>
-            </a:lvl5pPr>
-            <a:lvl6pPr marL="2514600" indent="-228600" algn="ctr" eaLnBrk="0" fontAlgn="base" hangingPunct="0">
-              <a:spcBef>
-                <a:spcPct val="0"/>
-              </a:spcBef>
-              <a:spcAft>
-                <a:spcPct val="0"/>
-              </a:spcAft>
-              <a:defRPr sz="2100">
-                <a:solidFill>
-                  <a:schemeClr val="tx1"/>
-                </a:solidFill>
-                <a:latin typeface="tahoma, verdana, arial" charset="0"/>
-                <a:cs typeface="Times New Roman" panose="02020603050405020304" pitchFamily="18" charset="0"/>
-              </a:defRPr>
-            </a:lvl6pPr>
-            <a:lvl7pPr marL="2971800" indent="-228600" algn="ctr" eaLnBrk="0" fontAlgn="base" hangingPunct="0">
-              <a:spcBef>
-                <a:spcPct val="0"/>
-              </a:spcBef>
-              <a:spcAft>
-                <a:spcPct val="0"/>
-              </a:spcAft>
-              <a:defRPr sz="2100">
-                <a:solidFill>
-                  <a:schemeClr val="tx1"/>
-                </a:solidFill>
-                <a:latin typeface="tahoma, verdana, arial" charset="0"/>
-                <a:cs typeface="Times New Roman" panose="02020603050405020304" pitchFamily="18" charset="0"/>
-              </a:defRPr>
-            </a:lvl7pPr>
-            <a:lvl8pPr marL="3429000" indent="-228600" algn="ctr" eaLnBrk="0" fontAlgn="base" hangingPunct="0">
-              <a:spcBef>
-                <a:spcPct val="0"/>
-              </a:spcBef>
-              <a:spcAft>
-                <a:spcPct val="0"/>
-              </a:spcAft>
-              <a:defRPr sz="2100">
-                <a:solidFill>
-                  <a:schemeClr val="tx1"/>
-                </a:solidFill>
-                <a:latin typeface="tahoma, verdana, arial" charset="0"/>
-                <a:cs typeface="Times New Roman" panose="02020603050405020304" pitchFamily="18" charset="0"/>
-              </a:defRPr>
-            </a:lvl8pPr>
-            <a:lvl9pPr marL="3886200" indent="-228600" algn="ctr" eaLnBrk="0" fontAlgn="base" hangingPunct="0">
-              <a:spcBef>
-                <a:spcPct val="0"/>
-              </a:spcBef>
-              <a:spcAft>
-                <a:spcPct val="0"/>
-              </a:spcAft>
-              <a:defRPr sz="2100">
-                <a:solidFill>
-                  <a:schemeClr val="tx1"/>
-                </a:solidFill>
-                <a:latin typeface="tahoma, verdana, arial" charset="0"/>
-                <a:cs typeface="Times New Roman" panose="02020603050405020304" pitchFamily="18" charset="0"/>
-              </a:defRPr>
-            </a:lvl9pPr>
-          </a:lstStyle>
-          <a:p>
-            <a:pPr algn="just" eaLnBrk="1" hangingPunct="1"/>
-            <a:r>
-              <a:rPr lang="pt-BR" altLang="pt-BR" sz="3307" dirty="0">
-                <a:latin typeface="Arial" panose="020B0604020202020204" pitchFamily="34" charset="0"/>
-                <a:cs typeface="Arial" panose="020B0604020202020204" pitchFamily="34" charset="0"/>
-              </a:rPr>
-              <a:t>Software FASTQC.</a:t>
-            </a:r>
-          </a:p>
-          <a:p>
-            <a:pPr algn="just" eaLnBrk="1" hangingPunct="1"/>
-            <a:r>
-              <a:rPr lang="pt-BR" altLang="pt-BR" sz="3307" dirty="0">
-                <a:latin typeface="Arial" panose="020B0604020202020204" pitchFamily="34" charset="0"/>
-                <a:cs typeface="Arial" panose="020B0604020202020204" pitchFamily="34" charset="0"/>
-              </a:rPr>
-              <a:t>Software </a:t>
-            </a:r>
-            <a:r>
-              <a:rPr lang="pt-BR" altLang="pt-BR" sz="3307" dirty="0" err="1">
-                <a:latin typeface="Arial" panose="020B0604020202020204" pitchFamily="34" charset="0"/>
-                <a:cs typeface="Arial" panose="020B0604020202020204" pitchFamily="34" charset="0"/>
-              </a:rPr>
-              <a:t>Trimmomatic</a:t>
-            </a:r>
-            <a:r>
-              <a:rPr lang="pt-BR" altLang="pt-BR" sz="3307" dirty="0">
-                <a:latin typeface="Arial" panose="020B0604020202020204" pitchFamily="34" charset="0"/>
-                <a:cs typeface="Arial" panose="020B0604020202020204" pitchFamily="34" charset="0"/>
-              </a:rPr>
-              <a:t>.</a:t>
-            </a:r>
-          </a:p>
-          <a:p>
-            <a:pPr algn="just" eaLnBrk="1" hangingPunct="1"/>
-            <a:r>
-              <a:rPr lang="pt-BR" altLang="pt-BR" sz="3307" dirty="0">
-                <a:latin typeface="Arial" panose="020B0604020202020204" pitchFamily="34" charset="0"/>
-                <a:cs typeface="Arial" panose="020B0604020202020204" pitchFamily="34" charset="0"/>
-              </a:rPr>
-              <a:t>Tabela PHREAD.</a:t>
-            </a:r>
-          </a:p>
-          <a:p>
-            <a:pPr algn="just" eaLnBrk="1" hangingPunct="1"/>
-            <a:endParaRPr lang="pt-BR" altLang="pt-BR" sz="3307" dirty="0">
-              <a:latin typeface="Arial" panose="020B0604020202020204" pitchFamily="34" charset="0"/>
-              <a:cs typeface="Arial" panose="020B0604020202020204" pitchFamily="34" charset="0"/>
-            </a:endParaRPr>
-          </a:p>
-        </p:txBody>
-      </p:sp>
-      <p:sp>
-        <p:nvSpPr>
-          <p:cNvPr id="28" name="Text Box 21">
-            <a:extLst>
-              <a:ext uri="{FF2B5EF4-FFF2-40B4-BE49-F238E27FC236}">
-                <a16:creationId xmlns:a16="http://schemas.microsoft.com/office/drawing/2014/main" id="{4F81C08F-CA77-CB0C-A4AF-3BE1315E1F65}"/>
-              </a:ext>
-            </a:extLst>
-          </p:cNvPr>
-          <p:cNvSpPr txBox="1"/>
-          <p:nvPr/>
-        </p:nvSpPr>
-        <p:spPr bwMode="auto">
-          <a:xfrm>
-            <a:off x="13543372" y="28184360"/>
-            <a:ext cx="5999395" cy="1605082"/>
-          </a:xfrm>
-          <a:prstGeom prst="rect">
-            <a:avLst/>
-          </a:prstGeom>
-          <a:noFill/>
-          <a:ln>
-            <a:noFill/>
-          </a:ln>
-          <a:extLst>
-            <a:ext uri="{909E8E84-426E-40DD-AFC4-6F175D3DCCD1}">
-              <a14:hiddenFill xmlns:a14="http://schemas.microsoft.com/office/drawing/2010/main">
-                <a:solidFill>
-                  <a:srgbClr val="FFFFFF"/>
-                </a:solidFill>
-              </a14:hiddenFill>
-            </a:ext>
-            <a:ext uri="{91240B29-F687-4F45-9708-019B960494DF}">
-              <a14:hiddenLine xmlns:a14="http://schemas.microsoft.com/office/drawing/2010/main" w="9525">
-                <a:solidFill>
-                  <a:srgbClr val="000000"/>
-                </a:solidFill>
-                <a:miter lim="800000"/>
-                <a:headEnd/>
-                <a:tailEnd/>
-              </a14:hiddenLine>
-            </a:ext>
-          </a:extLst>
-        </p:spPr>
-        <p:txBody>
-          <a:bodyPr wrap="square" lIns="77560" tIns="38780" rIns="77560" bIns="38780">
-            <a:spAutoFit/>
-          </a:bodyPr>
-          <a:lstStyle>
-            <a:lvl1pPr eaLnBrk="0" hangingPunct="0">
-              <a:defRPr sz="2100">
-                <a:solidFill>
-                  <a:schemeClr val="tx1"/>
-                </a:solidFill>
-                <a:latin typeface="tahoma, verdana, arial" charset="0"/>
-                <a:cs typeface="Times New Roman" panose="02020603050405020304" pitchFamily="18" charset="0"/>
-              </a:defRPr>
-            </a:lvl1pPr>
-            <a:lvl2pPr marL="742950" indent="-285750" eaLnBrk="0" hangingPunct="0">
-              <a:defRPr sz="2100">
-                <a:solidFill>
-                  <a:schemeClr val="tx1"/>
-                </a:solidFill>
-                <a:latin typeface="tahoma, verdana, arial" charset="0"/>
-                <a:cs typeface="Times New Roman" panose="02020603050405020304" pitchFamily="18" charset="0"/>
-              </a:defRPr>
-            </a:lvl2pPr>
-            <a:lvl3pPr marL="1143000" indent="-228600" eaLnBrk="0" hangingPunct="0">
-              <a:defRPr sz="2100">
-                <a:solidFill>
-                  <a:schemeClr val="tx1"/>
-                </a:solidFill>
-                <a:latin typeface="tahoma, verdana, arial" charset="0"/>
-                <a:cs typeface="Times New Roman" panose="02020603050405020304" pitchFamily="18" charset="0"/>
-              </a:defRPr>
-            </a:lvl3pPr>
-            <a:lvl4pPr marL="1600200" indent="-228600" eaLnBrk="0" hangingPunct="0">
-              <a:defRPr sz="2100">
-                <a:solidFill>
-                  <a:schemeClr val="tx1"/>
-                </a:solidFill>
-                <a:latin typeface="tahoma, verdana, arial" charset="0"/>
-                <a:cs typeface="Times New Roman" panose="02020603050405020304" pitchFamily="18" charset="0"/>
-              </a:defRPr>
-            </a:lvl4pPr>
-            <a:lvl5pPr marL="2057400" indent="-228600" eaLnBrk="0" hangingPunct="0">
-              <a:defRPr sz="2100">
-                <a:solidFill>
-                  <a:schemeClr val="tx1"/>
-                </a:solidFill>
-                <a:latin typeface="tahoma, verdana, arial" charset="0"/>
-                <a:cs typeface="Times New Roman" panose="02020603050405020304" pitchFamily="18" charset="0"/>
-              </a:defRPr>
-            </a:lvl5pPr>
-            <a:lvl6pPr marL="2514600" indent="-228600" algn="ctr" eaLnBrk="0" fontAlgn="base" hangingPunct="0">
-              <a:spcBef>
-                <a:spcPct val="0"/>
-              </a:spcBef>
-              <a:spcAft>
-                <a:spcPct val="0"/>
-              </a:spcAft>
-              <a:defRPr sz="2100">
-                <a:solidFill>
-                  <a:schemeClr val="tx1"/>
-                </a:solidFill>
-                <a:latin typeface="tahoma, verdana, arial" charset="0"/>
-                <a:cs typeface="Times New Roman" panose="02020603050405020304" pitchFamily="18" charset="0"/>
-              </a:defRPr>
-            </a:lvl6pPr>
-            <a:lvl7pPr marL="2971800" indent="-228600" algn="ctr" eaLnBrk="0" fontAlgn="base" hangingPunct="0">
-              <a:spcBef>
-                <a:spcPct val="0"/>
-              </a:spcBef>
-              <a:spcAft>
-                <a:spcPct val="0"/>
-              </a:spcAft>
-              <a:defRPr sz="2100">
-                <a:solidFill>
-                  <a:schemeClr val="tx1"/>
-                </a:solidFill>
-                <a:latin typeface="tahoma, verdana, arial" charset="0"/>
-                <a:cs typeface="Times New Roman" panose="02020603050405020304" pitchFamily="18" charset="0"/>
-              </a:defRPr>
-            </a:lvl7pPr>
-            <a:lvl8pPr marL="3429000" indent="-228600" algn="ctr" eaLnBrk="0" fontAlgn="base" hangingPunct="0">
-              <a:spcBef>
-                <a:spcPct val="0"/>
-              </a:spcBef>
-              <a:spcAft>
-                <a:spcPct val="0"/>
-              </a:spcAft>
-              <a:defRPr sz="2100">
-                <a:solidFill>
-                  <a:schemeClr val="tx1"/>
-                </a:solidFill>
-                <a:latin typeface="tahoma, verdana, arial" charset="0"/>
-                <a:cs typeface="Times New Roman" panose="02020603050405020304" pitchFamily="18" charset="0"/>
-              </a:defRPr>
-            </a:lvl8pPr>
-            <a:lvl9pPr marL="3886200" indent="-228600" algn="ctr" eaLnBrk="0" fontAlgn="base" hangingPunct="0">
-              <a:spcBef>
-                <a:spcPct val="0"/>
-              </a:spcBef>
-              <a:spcAft>
-                <a:spcPct val="0"/>
-              </a:spcAft>
-              <a:defRPr sz="2100">
-                <a:solidFill>
-                  <a:schemeClr val="tx1"/>
-                </a:solidFill>
-                <a:latin typeface="tahoma, verdana, arial" charset="0"/>
-                <a:cs typeface="Times New Roman" panose="02020603050405020304" pitchFamily="18" charset="0"/>
-              </a:defRPr>
-            </a:lvl9pPr>
-          </a:lstStyle>
-          <a:p>
-            <a:pPr algn="just" eaLnBrk="1" hangingPunct="1"/>
-            <a:r>
-              <a:rPr lang="pt-BR" altLang="pt-BR" sz="3307" dirty="0">
-                <a:latin typeface="Arial" panose="020B0604020202020204" pitchFamily="34" charset="0"/>
-                <a:cs typeface="Arial" panose="020B0604020202020204" pitchFamily="34" charset="0"/>
-              </a:rPr>
-              <a:t>Leitura VIRTUS2.</a:t>
-            </a:r>
-          </a:p>
-          <a:p>
-            <a:pPr algn="just" eaLnBrk="1" hangingPunct="1"/>
-            <a:r>
-              <a:rPr lang="pt-BR" altLang="pt-BR" sz="3307" dirty="0">
-                <a:latin typeface="Arial" panose="020B0604020202020204" pitchFamily="34" charset="0"/>
-                <a:cs typeface="Arial" panose="020B0604020202020204" pitchFamily="34" charset="0"/>
-              </a:rPr>
-              <a:t>Banco de dados NCBI.</a:t>
-            </a:r>
-          </a:p>
-          <a:p>
-            <a:pPr algn="just" eaLnBrk="1" hangingPunct="1"/>
-            <a:r>
-              <a:rPr lang="pt-BR" altLang="pt-BR" sz="3307" dirty="0">
-                <a:latin typeface="Arial" panose="020B0604020202020204" pitchFamily="34" charset="0"/>
-                <a:cs typeface="Arial" panose="020B0604020202020204" pitchFamily="34" charset="0"/>
-              </a:rPr>
-              <a:t>Leitura VIRTUS1.</a:t>
-            </a:r>
-          </a:p>
-        </p:txBody>
-      </p:sp>
-      <p:pic>
-        <p:nvPicPr>
-          <p:cNvPr id="42" name="Imagem 41">
-            <a:extLst>
-              <a:ext uri="{FF2B5EF4-FFF2-40B4-BE49-F238E27FC236}">
-                <a16:creationId xmlns:a16="http://schemas.microsoft.com/office/drawing/2014/main" id="{9ED7BB71-10F2-75A0-DCD4-7CACD50D63CB}"/>
+                <a16:creationId xmlns:a16="http://schemas.microsoft.com/office/drawing/2014/main" id="{FA371B8E-01CE-4047-809D-E1CB1C5B59D1}"/>
               </a:ext>
             </a:extLst>
           </p:cNvPr>
@@ -8443,15 +8437,21 @@
           <p:nvPr/>
         </p:nvPicPr>
         <p:blipFill>
-          <a:blip r:embed="rId11"/>
+          <a:blip r:embed="rId11">
+            <a:extLst>
+              <a:ext uri="{28A0092B-C50C-407E-A947-70E740481C1C}">
+                <a14:useLocalDpi xmlns:a14="http://schemas.microsoft.com/office/drawing/2010/main" val="0"/>
+              </a:ext>
+            </a:extLst>
+          </a:blip>
           <a:stretch>
             <a:fillRect/>
           </a:stretch>
         </p:blipFill>
         <p:spPr>
           <a:xfrm>
-            <a:off x="21406007" y="13234286"/>
-            <a:ext cx="10436003" cy="7069511"/>
+            <a:off x="24502089" y="32870204"/>
+            <a:ext cx="4038600" cy="4038600"/>
           </a:xfrm>
           <a:prstGeom prst="rect">
             <a:avLst/>

</xml_diff>